<commit_message>
[feature] add subscriber demo
</commit_message>
<xml_diff>
--- a/ObservableMode/观查者模式.pptx
+++ b/ObservableMode/观查者模式.pptx
@@ -5,23 +5,24 @@
     <p:sldMasterId id="2147483648" r:id="rId1"/>
   </p:sldMasterIdLst>
   <p:notesMasterIdLst>
-    <p:notesMasterId r:id="rId16"/>
+    <p:notesMasterId r:id="rId4"/>
   </p:notesMasterIdLst>
   <p:sldIdLst>
-    <p:sldId id="261" r:id="rId2"/>
-    <p:sldId id="340" r:id="rId3"/>
-    <p:sldId id="356" r:id="rId4"/>
-    <p:sldId id="341" r:id="rId5"/>
-    <p:sldId id="354" r:id="rId6"/>
-    <p:sldId id="342" r:id="rId7"/>
-    <p:sldId id="344" r:id="rId8"/>
-    <p:sldId id="349" r:id="rId9"/>
-    <p:sldId id="346" r:id="rId10"/>
-    <p:sldId id="355" r:id="rId11"/>
-    <p:sldId id="348" r:id="rId12"/>
-    <p:sldId id="358" r:id="rId13"/>
-    <p:sldId id="357" r:id="rId14"/>
-    <p:sldId id="345" r:id="rId15"/>
+    <p:sldId id="261" r:id="rId3"/>
+    <p:sldId id="340" r:id="rId5"/>
+    <p:sldId id="356" r:id="rId6"/>
+    <p:sldId id="341" r:id="rId7"/>
+    <p:sldId id="354" r:id="rId8"/>
+    <p:sldId id="342" r:id="rId9"/>
+    <p:sldId id="344" r:id="rId10"/>
+    <p:sldId id="349" r:id="rId11"/>
+    <p:sldId id="346" r:id="rId12"/>
+    <p:sldId id="355" r:id="rId13"/>
+    <p:sldId id="348" r:id="rId14"/>
+    <p:sldId id="369" r:id="rId15"/>
+    <p:sldId id="358" r:id="rId16"/>
+    <p:sldId id="357" r:id="rId17"/>
+    <p:sldId id="345" r:id="rId18"/>
   </p:sldIdLst>
   <p:sldSz cx="9144000" cy="5143500" type="screen16x9"/>
   <p:notesSz cx="6858000" cy="9144000"/>
@@ -120,22 +121,6 @@
       </a:defRPr>
     </a:lvl9pPr>
   </p:defaultTextStyle>
-  <p:extLst>
-    <p:ext uri="{EFAFB233-063F-42B5-8137-9DF3F51BA10A}">
-      <p15:sldGuideLst xmlns:p15="http://schemas.microsoft.com/office/powerpoint/2012/main">
-        <p15:guide id="1" orient="horz" pos="1606">
-          <p15:clr>
-            <a:srgbClr val="A4A3A4"/>
-          </p15:clr>
-        </p15:guide>
-        <p15:guide id="2" pos="2878">
-          <p15:clr>
-            <a:srgbClr val="A4A3A4"/>
-          </p15:clr>
-        </p15:guide>
-      </p15:sldGuideLst>
-    </p:ext>
-  </p:extLst>
 </p:presentation>
 </file>
 
@@ -221,7 +206,6 @@
           <a:p>
             <a:fld id="{2AF4AE00-8C20-E140-8CCC-99691ABCAB19}" type="datetimeFigureOut">
               <a:rPr kumimoji="1" lang="zh-CN" altLang="en-US" smtClean="0"/>
-              <a:t>2022/2/19</a:t>
             </a:fld>
             <a:endParaRPr kumimoji="1" lang="zh-CN" altLang="en-US"/>
           </a:p>
@@ -291,6 +275,7 @@
 第四级
 第五级</a:t>
             </a:r>
+            <a:endParaRPr kumimoji="1" lang="zh-CN" altLang="en-US"/>
           </a:p>
         </p:txBody>
       </p:sp>
@@ -354,7 +339,6 @@
           <a:p>
             <a:fld id="{2FEC3D8C-82CB-BD4D-A1DB-E7DE9E519923}" type="slidenum">
               <a:rPr kumimoji="1" lang="zh-CN" altLang="en-US" smtClean="0"/>
-              <a:t>‹#›</a:t>
             </a:fld>
             <a:endParaRPr kumimoji="1" lang="zh-CN" altLang="en-US"/>
           </a:p>
@@ -579,7 +563,6 @@
           <a:p>
             <a:fld id="{2FEC3D8C-82CB-BD4D-A1DB-E7DE9E519923}" type="slidenum">
               <a:rPr kumimoji="1" lang="zh-CN" altLang="en-US" smtClean="0"/>
-              <a:t>10</a:t>
             </a:fld>
             <a:endParaRPr kumimoji="1" lang="zh-CN" altLang="en-US"/>
           </a:p>
@@ -662,7 +645,6 @@
           <a:p>
             <a:fld id="{2FEC3D8C-82CB-BD4D-A1DB-E7DE9E519923}" type="slidenum">
               <a:rPr kumimoji="1" lang="zh-CN" altLang="en-US" smtClean="0"/>
-              <a:t>11</a:t>
             </a:fld>
             <a:endParaRPr kumimoji="1" lang="zh-CN" altLang="en-US"/>
           </a:p>
@@ -745,18 +727,12 @@
           <a:p>
             <a:fld id="{2FEC3D8C-82CB-BD4D-A1DB-E7DE9E519923}" type="slidenum">
               <a:rPr kumimoji="1" lang="zh-CN" altLang="en-US" smtClean="0"/>
-              <a:t>12</a:t>
             </a:fld>
             <a:endParaRPr kumimoji="1" lang="zh-CN" altLang="en-US"/>
           </a:p>
         </p:txBody>
       </p:sp>
     </p:spTree>
-    <p:extLst>
-      <p:ext uri="{BB962C8B-B14F-4D97-AF65-F5344CB8AC3E}">
-        <p14:creationId xmlns:p14="http://schemas.microsoft.com/office/powerpoint/2010/main" val="3813959962"/>
-      </p:ext>
-    </p:extLst>
   </p:cSld>
   <p:clrMapOvr>
     <a:masterClrMapping/>
@@ -833,18 +809,94 @@
           <a:p>
             <a:fld id="{2FEC3D8C-82CB-BD4D-A1DB-E7DE9E519923}" type="slidenum">
               <a:rPr kumimoji="1" lang="zh-CN" altLang="en-US" smtClean="0"/>
-              <a:t>13</a:t>
             </a:fld>
             <a:endParaRPr kumimoji="1" lang="zh-CN" altLang="en-US"/>
           </a:p>
         </p:txBody>
       </p:sp>
     </p:spTree>
-    <p:extLst>
-      <p:ext uri="{BB962C8B-B14F-4D97-AF65-F5344CB8AC3E}">
-        <p14:creationId xmlns:p14="http://schemas.microsoft.com/office/powerpoint/2010/main" val="2616160142"/>
-      </p:ext>
-    </p:extLst>
+  </p:cSld>
+  <p:clrMapOvr>
+    <a:masterClrMapping/>
+  </p:clrMapOvr>
+</p:notes>
+</file>
+
+<file path=ppt/notesSlides/notesSlide14.xml><?xml version="1.0" encoding="utf-8"?>
+<p:notes xmlns:a="http://schemas.openxmlformats.org/drawingml/2006/main" xmlns:r="http://schemas.openxmlformats.org/officeDocument/2006/relationships" xmlns:p="http://schemas.openxmlformats.org/presentationml/2006/main">
+  <p:cSld>
+    <p:spTree>
+      <p:nvGrpSpPr>
+        <p:cNvPr id="1" name=""/>
+        <p:cNvGrpSpPr/>
+        <p:nvPr/>
+      </p:nvGrpSpPr>
+      <p:grpSpPr>
+        <a:xfrm>
+          <a:off x="0" y="0"/>
+          <a:ext cx="0" cy="0"/>
+          <a:chOff x="0" y="0"/>
+          <a:chExt cx="0" cy="0"/>
+        </a:xfrm>
+      </p:grpSpPr>
+      <p:sp>
+        <p:nvSpPr>
+          <p:cNvPr id="2" name="幻灯片图像占位符 1"/>
+          <p:cNvSpPr>
+            <a:spLocks noGrp="1" noRot="1" noChangeAspect="1"/>
+          </p:cNvSpPr>
+          <p:nvPr>
+            <p:ph type="sldImg"/>
+          </p:nvPr>
+        </p:nvSpPr>
+        <p:spPr/>
+      </p:sp>
+      <p:sp>
+        <p:nvSpPr>
+          <p:cNvPr id="3" name="备注占位符 2"/>
+          <p:cNvSpPr>
+            <a:spLocks noGrp="1"/>
+          </p:cNvSpPr>
+          <p:nvPr>
+            <p:ph type="body" idx="1"/>
+          </p:nvPr>
+        </p:nvSpPr>
+        <p:spPr/>
+        <p:txBody>
+          <a:bodyPr/>
+          <a:lstStyle/>
+          <a:p>
+            <a:r>
+              <a:rPr kumimoji="1" lang="en-US" altLang="zh-CN" dirty="0"/>
+              <a:t>https://refactoringguru.cn/design-patterns/observer</a:t>
+            </a:r>
+            <a:endParaRPr kumimoji="1" lang="zh-CN" altLang="en-US" dirty="0"/>
+          </a:p>
+        </p:txBody>
+      </p:sp>
+      <p:sp>
+        <p:nvSpPr>
+          <p:cNvPr id="4" name="灯片编号占位符 3"/>
+          <p:cNvSpPr>
+            <a:spLocks noGrp="1"/>
+          </p:cNvSpPr>
+          <p:nvPr>
+            <p:ph type="sldNum" sz="quarter" idx="10"/>
+          </p:nvPr>
+        </p:nvSpPr>
+        <p:spPr/>
+        <p:txBody>
+          <a:bodyPr/>
+          <a:lstStyle/>
+          <a:p>
+            <a:fld id="{2FEC3D8C-82CB-BD4D-A1DB-E7DE9E519923}" type="slidenum">
+              <a:rPr kumimoji="1" lang="zh-CN" altLang="en-US" smtClean="0"/>
+            </a:fld>
+            <a:endParaRPr kumimoji="1" lang="zh-CN" altLang="en-US"/>
+          </a:p>
+        </p:txBody>
+      </p:sp>
+    </p:spTree>
   </p:cSld>
   <p:clrMapOvr>
     <a:masterClrMapping/>
@@ -917,7 +969,6 @@
           <a:p>
             <a:fld id="{2FEC3D8C-82CB-BD4D-A1DB-E7DE9E519923}" type="slidenum">
               <a:rPr kumimoji="1" lang="zh-CN" altLang="en-US" smtClean="0"/>
-              <a:t>2</a:t>
             </a:fld>
             <a:endParaRPr kumimoji="1" lang="zh-CN" altLang="en-US"/>
           </a:p>
@@ -996,18 +1047,12 @@
           <a:p>
             <a:fld id="{2FEC3D8C-82CB-BD4D-A1DB-E7DE9E519923}" type="slidenum">
               <a:rPr kumimoji="1" lang="zh-CN" altLang="en-US" smtClean="0"/>
-              <a:t>3</a:t>
             </a:fld>
             <a:endParaRPr kumimoji="1" lang="zh-CN" altLang="en-US"/>
           </a:p>
         </p:txBody>
       </p:sp>
     </p:spTree>
-    <p:extLst>
-      <p:ext uri="{BB962C8B-B14F-4D97-AF65-F5344CB8AC3E}">
-        <p14:creationId xmlns:p14="http://schemas.microsoft.com/office/powerpoint/2010/main" val="1696999776"/>
-      </p:ext>
-    </p:extLst>
   </p:cSld>
   <p:clrMapOvr>
     <a:masterClrMapping/>
@@ -1080,7 +1125,6 @@
           <a:p>
             <a:fld id="{2FEC3D8C-82CB-BD4D-A1DB-E7DE9E519923}" type="slidenum">
               <a:rPr kumimoji="1" lang="zh-CN" altLang="en-US" smtClean="0"/>
-              <a:t>4</a:t>
             </a:fld>
             <a:endParaRPr kumimoji="1" lang="zh-CN" altLang="en-US"/>
           </a:p>
@@ -1159,7 +1203,6 @@
           <a:p>
             <a:fld id="{2FEC3D8C-82CB-BD4D-A1DB-E7DE9E519923}" type="slidenum">
               <a:rPr kumimoji="1" lang="zh-CN" altLang="en-US" smtClean="0"/>
-              <a:t>5</a:t>
             </a:fld>
             <a:endParaRPr kumimoji="1" lang="zh-CN" altLang="en-US"/>
           </a:p>
@@ -1238,7 +1281,6 @@
           <a:p>
             <a:fld id="{2FEC3D8C-82CB-BD4D-A1DB-E7DE9E519923}" type="slidenum">
               <a:rPr kumimoji="1" lang="zh-CN" altLang="en-US" smtClean="0"/>
-              <a:t>6</a:t>
             </a:fld>
             <a:endParaRPr kumimoji="1" lang="zh-CN" altLang="en-US"/>
           </a:p>
@@ -1317,7 +1359,6 @@
           <a:p>
             <a:fld id="{2FEC3D8C-82CB-BD4D-A1DB-E7DE9E519923}" type="slidenum">
               <a:rPr kumimoji="1" lang="zh-CN" altLang="en-US" smtClean="0"/>
-              <a:t>7</a:t>
             </a:fld>
             <a:endParaRPr kumimoji="1" lang="zh-CN" altLang="en-US"/>
           </a:p>
@@ -1396,7 +1437,6 @@
           <a:p>
             <a:fld id="{2FEC3D8C-82CB-BD4D-A1DB-E7DE9E519923}" type="slidenum">
               <a:rPr kumimoji="1" lang="zh-CN" altLang="en-US" smtClean="0"/>
-              <a:t>8</a:t>
             </a:fld>
             <a:endParaRPr kumimoji="1" lang="zh-CN" altLang="en-US"/>
           </a:p>
@@ -1475,7 +1515,6 @@
           <a:p>
             <a:fld id="{2FEC3D8C-82CB-BD4D-A1DB-E7DE9E519923}" type="slidenum">
               <a:rPr kumimoji="1" lang="zh-CN" altLang="en-US" smtClean="0"/>
-              <a:t>9</a:t>
             </a:fld>
             <a:endParaRPr kumimoji="1" lang="zh-CN" altLang="en-US"/>
           </a:p>
@@ -1530,6 +1569,7 @@
               <a:rPr lang="zh-CN" altLang="en-US"/>
               <a:t>单击此处编辑母版标题样式</a:t>
             </a:r>
+            <a:endParaRPr lang="zh-CN" altLang="en-US"/>
           </a:p>
         </p:txBody>
       </p:sp>
@@ -1648,6 +1688,7 @@
               <a:rPr lang="zh-CN" altLang="en-US"/>
               <a:t>单击此处编辑母版副标题样式</a:t>
             </a:r>
+            <a:endParaRPr lang="zh-CN" altLang="en-US"/>
           </a:p>
         </p:txBody>
       </p:sp>
@@ -1668,7 +1709,6 @@
           <a:p>
             <a:fld id="{26843F14-D882-43D2-910D-7D4F87C69D2D}" type="datetimeFigureOut">
               <a:rPr lang="zh-CN" altLang="en-US" smtClean="0"/>
-              <a:t>2022/2/19</a:t>
             </a:fld>
             <a:endParaRPr lang="zh-CN" altLang="en-US"/>
           </a:p>
@@ -1710,7 +1750,6 @@
           <a:p>
             <a:fld id="{8EAC17D0-B82B-4518-9083-C784B5308AA6}" type="slidenum">
               <a:rPr lang="zh-CN" altLang="en-US" smtClean="0"/>
-              <a:t>‹#›</a:t>
             </a:fld>
             <a:endParaRPr lang="zh-CN" altLang="en-US"/>
           </a:p>
@@ -1760,6 +1799,7 @@
               <a:rPr lang="zh-CN" altLang="en-US"/>
               <a:t>单击此处编辑母版标题样式</a:t>
             </a:r>
+            <a:endParaRPr lang="zh-CN" altLang="en-US"/>
           </a:p>
         </p:txBody>
       </p:sp>
@@ -1783,6 +1823,7 @@
               <a:rPr lang="zh-CN" altLang="en-US"/>
               <a:t>单击此处编辑母版文本样式</a:t>
             </a:r>
+            <a:endParaRPr lang="zh-CN" altLang="en-US"/>
           </a:p>
           <a:p>
             <a:pPr lvl="1"/>
@@ -1790,6 +1831,7 @@
               <a:rPr lang="zh-CN" altLang="en-US"/>
               <a:t>第二级</a:t>
             </a:r>
+            <a:endParaRPr lang="zh-CN" altLang="en-US"/>
           </a:p>
           <a:p>
             <a:pPr lvl="2"/>
@@ -1797,6 +1839,7 @@
               <a:rPr lang="zh-CN" altLang="en-US"/>
               <a:t>第三级</a:t>
             </a:r>
+            <a:endParaRPr lang="zh-CN" altLang="en-US"/>
           </a:p>
           <a:p>
             <a:pPr lvl="3"/>
@@ -1804,6 +1847,7 @@
               <a:rPr lang="zh-CN" altLang="en-US"/>
               <a:t>第四级</a:t>
             </a:r>
+            <a:endParaRPr lang="zh-CN" altLang="en-US"/>
           </a:p>
           <a:p>
             <a:pPr lvl="4"/>
@@ -1811,6 +1855,7 @@
               <a:rPr lang="zh-CN" altLang="en-US"/>
               <a:t>第五级</a:t>
             </a:r>
+            <a:endParaRPr lang="zh-CN" altLang="en-US"/>
           </a:p>
         </p:txBody>
       </p:sp>
@@ -1831,7 +1876,6 @@
           <a:p>
             <a:fld id="{26843F14-D882-43D2-910D-7D4F87C69D2D}" type="datetimeFigureOut">
               <a:rPr lang="zh-CN" altLang="en-US" smtClean="0"/>
-              <a:t>2022/2/19</a:t>
             </a:fld>
             <a:endParaRPr lang="zh-CN" altLang="en-US"/>
           </a:p>
@@ -1873,7 +1917,6 @@
           <a:p>
             <a:fld id="{8EAC17D0-B82B-4518-9083-C784B5308AA6}" type="slidenum">
               <a:rPr lang="zh-CN" altLang="en-US" smtClean="0"/>
-              <a:t>‹#›</a:t>
             </a:fld>
             <a:endParaRPr lang="zh-CN" altLang="en-US"/>
           </a:p>
@@ -1928,6 +1971,7 @@
               <a:rPr lang="zh-CN" altLang="en-US"/>
               <a:t>单击此处编辑母版标题样式</a:t>
             </a:r>
+            <a:endParaRPr lang="zh-CN" altLang="en-US"/>
           </a:p>
         </p:txBody>
       </p:sp>
@@ -1956,6 +2000,7 @@
               <a:rPr lang="zh-CN" altLang="en-US"/>
               <a:t>单击此处编辑母版文本样式</a:t>
             </a:r>
+            <a:endParaRPr lang="zh-CN" altLang="en-US"/>
           </a:p>
           <a:p>
             <a:pPr lvl="1"/>
@@ -1963,6 +2008,7 @@
               <a:rPr lang="zh-CN" altLang="en-US"/>
               <a:t>第二级</a:t>
             </a:r>
+            <a:endParaRPr lang="zh-CN" altLang="en-US"/>
           </a:p>
           <a:p>
             <a:pPr lvl="2"/>
@@ -1970,6 +2016,7 @@
               <a:rPr lang="zh-CN" altLang="en-US"/>
               <a:t>第三级</a:t>
             </a:r>
+            <a:endParaRPr lang="zh-CN" altLang="en-US"/>
           </a:p>
           <a:p>
             <a:pPr lvl="3"/>
@@ -1977,6 +2024,7 @@
               <a:rPr lang="zh-CN" altLang="en-US"/>
               <a:t>第四级</a:t>
             </a:r>
+            <a:endParaRPr lang="zh-CN" altLang="en-US"/>
           </a:p>
           <a:p>
             <a:pPr lvl="4"/>
@@ -1984,6 +2032,7 @@
               <a:rPr lang="zh-CN" altLang="en-US"/>
               <a:t>第五级</a:t>
             </a:r>
+            <a:endParaRPr lang="zh-CN" altLang="en-US"/>
           </a:p>
         </p:txBody>
       </p:sp>
@@ -2004,7 +2053,6 @@
           <a:p>
             <a:fld id="{26843F14-D882-43D2-910D-7D4F87C69D2D}" type="datetimeFigureOut">
               <a:rPr lang="zh-CN" altLang="en-US" smtClean="0"/>
-              <a:t>2022/2/19</a:t>
             </a:fld>
             <a:endParaRPr lang="zh-CN" altLang="en-US"/>
           </a:p>
@@ -2046,7 +2094,6 @@
           <a:p>
             <a:fld id="{8EAC17D0-B82B-4518-9083-C784B5308AA6}" type="slidenum">
               <a:rPr lang="zh-CN" altLang="en-US" smtClean="0"/>
-              <a:t>‹#›</a:t>
             </a:fld>
             <a:endParaRPr lang="zh-CN" altLang="en-US"/>
           </a:p>
@@ -2096,6 +2143,7 @@
               <a:rPr lang="zh-CN" altLang="en-US"/>
               <a:t>单击此处编辑母版标题样式</a:t>
             </a:r>
+            <a:endParaRPr lang="zh-CN" altLang="en-US"/>
           </a:p>
         </p:txBody>
       </p:sp>
@@ -2119,6 +2167,7 @@
               <a:rPr lang="zh-CN" altLang="en-US"/>
               <a:t>单击此处编辑母版文本样式</a:t>
             </a:r>
+            <a:endParaRPr lang="zh-CN" altLang="en-US"/>
           </a:p>
           <a:p>
             <a:pPr lvl="1"/>
@@ -2126,6 +2175,7 @@
               <a:rPr lang="zh-CN" altLang="en-US"/>
               <a:t>第二级</a:t>
             </a:r>
+            <a:endParaRPr lang="zh-CN" altLang="en-US"/>
           </a:p>
           <a:p>
             <a:pPr lvl="2"/>
@@ -2133,6 +2183,7 @@
               <a:rPr lang="zh-CN" altLang="en-US"/>
               <a:t>第三级</a:t>
             </a:r>
+            <a:endParaRPr lang="zh-CN" altLang="en-US"/>
           </a:p>
           <a:p>
             <a:pPr lvl="3"/>
@@ -2140,6 +2191,7 @@
               <a:rPr lang="zh-CN" altLang="en-US"/>
               <a:t>第四级</a:t>
             </a:r>
+            <a:endParaRPr lang="zh-CN" altLang="en-US"/>
           </a:p>
           <a:p>
             <a:pPr lvl="4"/>
@@ -2147,6 +2199,7 @@
               <a:rPr lang="zh-CN" altLang="en-US"/>
               <a:t>第五级</a:t>
             </a:r>
+            <a:endParaRPr lang="zh-CN" altLang="en-US"/>
           </a:p>
         </p:txBody>
       </p:sp>
@@ -2167,7 +2220,6 @@
           <a:p>
             <a:fld id="{26843F14-D882-43D2-910D-7D4F87C69D2D}" type="datetimeFigureOut">
               <a:rPr lang="zh-CN" altLang="en-US" smtClean="0"/>
-              <a:t>2022/2/19</a:t>
             </a:fld>
             <a:endParaRPr lang="zh-CN" altLang="en-US"/>
           </a:p>
@@ -2209,7 +2261,6 @@
           <a:p>
             <a:fld id="{8EAC17D0-B82B-4518-9083-C784B5308AA6}" type="slidenum">
               <a:rPr lang="zh-CN" altLang="en-US" smtClean="0"/>
-              <a:t>‹#›</a:t>
             </a:fld>
             <a:endParaRPr lang="zh-CN" altLang="en-US"/>
           </a:p>
@@ -2268,6 +2319,7 @@
               <a:rPr lang="zh-CN" altLang="en-US"/>
               <a:t>单击此处编辑母版标题样式</a:t>
             </a:r>
+            <a:endParaRPr lang="zh-CN" altLang="en-US"/>
           </a:p>
         </p:txBody>
       </p:sp>
@@ -2387,6 +2439,7 @@
               <a:rPr lang="zh-CN" altLang="en-US"/>
               <a:t>单击此处编辑母版文本样式</a:t>
             </a:r>
+            <a:endParaRPr lang="zh-CN" altLang="en-US"/>
           </a:p>
         </p:txBody>
       </p:sp>
@@ -2407,7 +2460,6 @@
           <a:p>
             <a:fld id="{26843F14-D882-43D2-910D-7D4F87C69D2D}" type="datetimeFigureOut">
               <a:rPr lang="zh-CN" altLang="en-US" smtClean="0"/>
-              <a:t>2022/2/19</a:t>
             </a:fld>
             <a:endParaRPr lang="zh-CN" altLang="en-US"/>
           </a:p>
@@ -2449,7 +2501,6 @@
           <a:p>
             <a:fld id="{8EAC17D0-B82B-4518-9083-C784B5308AA6}" type="slidenum">
               <a:rPr lang="zh-CN" altLang="en-US" smtClean="0"/>
-              <a:t>‹#›</a:t>
             </a:fld>
             <a:endParaRPr lang="zh-CN" altLang="en-US"/>
           </a:p>
@@ -2499,6 +2550,7 @@
               <a:rPr lang="zh-CN" altLang="en-US"/>
               <a:t>单击此处编辑母版标题样式</a:t>
             </a:r>
+            <a:endParaRPr lang="zh-CN" altLang="en-US"/>
           </a:p>
         </p:txBody>
       </p:sp>
@@ -2555,6 +2607,7 @@
               <a:rPr lang="zh-CN" altLang="en-US"/>
               <a:t>单击此处编辑母版文本样式</a:t>
             </a:r>
+            <a:endParaRPr lang="zh-CN" altLang="en-US"/>
           </a:p>
           <a:p>
             <a:pPr lvl="1"/>
@@ -2562,6 +2615,7 @@
               <a:rPr lang="zh-CN" altLang="en-US"/>
               <a:t>第二级</a:t>
             </a:r>
+            <a:endParaRPr lang="zh-CN" altLang="en-US"/>
           </a:p>
           <a:p>
             <a:pPr lvl="2"/>
@@ -2569,6 +2623,7 @@
               <a:rPr lang="zh-CN" altLang="en-US"/>
               <a:t>第三级</a:t>
             </a:r>
+            <a:endParaRPr lang="zh-CN" altLang="en-US"/>
           </a:p>
           <a:p>
             <a:pPr lvl="3"/>
@@ -2576,6 +2631,7 @@
               <a:rPr lang="zh-CN" altLang="en-US"/>
               <a:t>第四级</a:t>
             </a:r>
+            <a:endParaRPr lang="zh-CN" altLang="en-US"/>
           </a:p>
           <a:p>
             <a:pPr lvl="4"/>
@@ -2583,6 +2639,7 @@
               <a:rPr lang="zh-CN" altLang="en-US"/>
               <a:t>第五级</a:t>
             </a:r>
+            <a:endParaRPr lang="zh-CN" altLang="en-US"/>
           </a:p>
         </p:txBody>
       </p:sp>
@@ -2639,6 +2696,7 @@
               <a:rPr lang="zh-CN" altLang="en-US"/>
               <a:t>单击此处编辑母版文本样式</a:t>
             </a:r>
+            <a:endParaRPr lang="zh-CN" altLang="en-US"/>
           </a:p>
           <a:p>
             <a:pPr lvl="1"/>
@@ -2646,6 +2704,7 @@
               <a:rPr lang="zh-CN" altLang="en-US"/>
               <a:t>第二级</a:t>
             </a:r>
+            <a:endParaRPr lang="zh-CN" altLang="en-US"/>
           </a:p>
           <a:p>
             <a:pPr lvl="2"/>
@@ -2653,6 +2712,7 @@
               <a:rPr lang="zh-CN" altLang="en-US"/>
               <a:t>第三级</a:t>
             </a:r>
+            <a:endParaRPr lang="zh-CN" altLang="en-US"/>
           </a:p>
           <a:p>
             <a:pPr lvl="3"/>
@@ -2660,6 +2720,7 @@
               <a:rPr lang="zh-CN" altLang="en-US"/>
               <a:t>第四级</a:t>
             </a:r>
+            <a:endParaRPr lang="zh-CN" altLang="en-US"/>
           </a:p>
           <a:p>
             <a:pPr lvl="4"/>
@@ -2667,6 +2728,7 @@
               <a:rPr lang="zh-CN" altLang="en-US"/>
               <a:t>第五级</a:t>
             </a:r>
+            <a:endParaRPr lang="zh-CN" altLang="en-US"/>
           </a:p>
         </p:txBody>
       </p:sp>
@@ -2687,7 +2749,6 @@
           <a:p>
             <a:fld id="{26843F14-D882-43D2-910D-7D4F87C69D2D}" type="datetimeFigureOut">
               <a:rPr lang="zh-CN" altLang="en-US" smtClean="0"/>
-              <a:t>2022/2/19</a:t>
             </a:fld>
             <a:endParaRPr lang="zh-CN" altLang="en-US"/>
           </a:p>
@@ -2729,7 +2790,6 @@
           <a:p>
             <a:fld id="{8EAC17D0-B82B-4518-9083-C784B5308AA6}" type="slidenum">
               <a:rPr lang="zh-CN" altLang="en-US" smtClean="0"/>
-              <a:t>‹#›</a:t>
             </a:fld>
             <a:endParaRPr lang="zh-CN" altLang="en-US"/>
           </a:p>
@@ -2788,6 +2848,7 @@
               <a:rPr lang="zh-CN" altLang="en-US"/>
               <a:t>单击此处编辑母版标题样式</a:t>
             </a:r>
+            <a:endParaRPr lang="zh-CN" altLang="en-US"/>
           </a:p>
         </p:txBody>
       </p:sp>
@@ -2853,6 +2914,7 @@
               <a:rPr lang="zh-CN" altLang="en-US"/>
               <a:t>单击此处编辑母版文本样式</a:t>
             </a:r>
+            <a:endParaRPr lang="zh-CN" altLang="en-US"/>
           </a:p>
         </p:txBody>
       </p:sp>
@@ -2909,6 +2971,7 @@
               <a:rPr lang="zh-CN" altLang="en-US"/>
               <a:t>单击此处编辑母版文本样式</a:t>
             </a:r>
+            <a:endParaRPr lang="zh-CN" altLang="en-US"/>
           </a:p>
           <a:p>
             <a:pPr lvl="1"/>
@@ -2916,6 +2979,7 @@
               <a:rPr lang="zh-CN" altLang="en-US"/>
               <a:t>第二级</a:t>
             </a:r>
+            <a:endParaRPr lang="zh-CN" altLang="en-US"/>
           </a:p>
           <a:p>
             <a:pPr lvl="2"/>
@@ -2923,6 +2987,7 @@
               <a:rPr lang="zh-CN" altLang="en-US"/>
               <a:t>第三级</a:t>
             </a:r>
+            <a:endParaRPr lang="zh-CN" altLang="en-US"/>
           </a:p>
           <a:p>
             <a:pPr lvl="3"/>
@@ -2930,6 +2995,7 @@
               <a:rPr lang="zh-CN" altLang="en-US"/>
               <a:t>第四级</a:t>
             </a:r>
+            <a:endParaRPr lang="zh-CN" altLang="en-US"/>
           </a:p>
           <a:p>
             <a:pPr lvl="4"/>
@@ -2937,6 +3003,7 @@
               <a:rPr lang="zh-CN" altLang="en-US"/>
               <a:t>第五级</a:t>
             </a:r>
+            <a:endParaRPr lang="zh-CN" altLang="en-US"/>
           </a:p>
         </p:txBody>
       </p:sp>
@@ -3002,6 +3069,7 @@
               <a:rPr lang="zh-CN" altLang="en-US"/>
               <a:t>单击此处编辑母版文本样式</a:t>
             </a:r>
+            <a:endParaRPr lang="zh-CN" altLang="en-US"/>
           </a:p>
         </p:txBody>
       </p:sp>
@@ -3058,6 +3126,7 @@
               <a:rPr lang="zh-CN" altLang="en-US"/>
               <a:t>单击此处编辑母版文本样式</a:t>
             </a:r>
+            <a:endParaRPr lang="zh-CN" altLang="en-US"/>
           </a:p>
           <a:p>
             <a:pPr lvl="1"/>
@@ -3065,6 +3134,7 @@
               <a:rPr lang="zh-CN" altLang="en-US"/>
               <a:t>第二级</a:t>
             </a:r>
+            <a:endParaRPr lang="zh-CN" altLang="en-US"/>
           </a:p>
           <a:p>
             <a:pPr lvl="2"/>
@@ -3072,6 +3142,7 @@
               <a:rPr lang="zh-CN" altLang="en-US"/>
               <a:t>第三级</a:t>
             </a:r>
+            <a:endParaRPr lang="zh-CN" altLang="en-US"/>
           </a:p>
           <a:p>
             <a:pPr lvl="3"/>
@@ -3079,6 +3150,7 @@
               <a:rPr lang="zh-CN" altLang="en-US"/>
               <a:t>第四级</a:t>
             </a:r>
+            <a:endParaRPr lang="zh-CN" altLang="en-US"/>
           </a:p>
           <a:p>
             <a:pPr lvl="4"/>
@@ -3086,6 +3158,7 @@
               <a:rPr lang="zh-CN" altLang="en-US"/>
               <a:t>第五级</a:t>
             </a:r>
+            <a:endParaRPr lang="zh-CN" altLang="en-US"/>
           </a:p>
         </p:txBody>
       </p:sp>
@@ -3106,7 +3179,6 @@
           <a:p>
             <a:fld id="{26843F14-D882-43D2-910D-7D4F87C69D2D}" type="datetimeFigureOut">
               <a:rPr lang="zh-CN" altLang="en-US" smtClean="0"/>
-              <a:t>2022/2/19</a:t>
             </a:fld>
             <a:endParaRPr lang="zh-CN" altLang="en-US"/>
           </a:p>
@@ -3148,7 +3220,6 @@
           <a:p>
             <a:fld id="{8EAC17D0-B82B-4518-9083-C784B5308AA6}" type="slidenum">
               <a:rPr lang="zh-CN" altLang="en-US" smtClean="0"/>
-              <a:t>‹#›</a:t>
             </a:fld>
             <a:endParaRPr lang="zh-CN" altLang="en-US"/>
           </a:p>
@@ -3198,6 +3269,7 @@
               <a:rPr lang="zh-CN" altLang="en-US"/>
               <a:t>单击此处编辑母版标题样式</a:t>
             </a:r>
+            <a:endParaRPr lang="zh-CN" altLang="en-US"/>
           </a:p>
         </p:txBody>
       </p:sp>
@@ -3218,7 +3290,6 @@
           <a:p>
             <a:fld id="{26843F14-D882-43D2-910D-7D4F87C69D2D}" type="datetimeFigureOut">
               <a:rPr lang="zh-CN" altLang="en-US" smtClean="0"/>
-              <a:t>2022/2/19</a:t>
             </a:fld>
             <a:endParaRPr lang="zh-CN" altLang="en-US"/>
           </a:p>
@@ -3260,7 +3331,6 @@
           <a:p>
             <a:fld id="{8EAC17D0-B82B-4518-9083-C784B5308AA6}" type="slidenum">
               <a:rPr lang="zh-CN" altLang="en-US" smtClean="0"/>
-              <a:t>‹#›</a:t>
             </a:fld>
             <a:endParaRPr lang="zh-CN" altLang="en-US"/>
           </a:p>
@@ -3308,7 +3378,6 @@
           <a:p>
             <a:fld id="{26843F14-D882-43D2-910D-7D4F87C69D2D}" type="datetimeFigureOut">
               <a:rPr lang="zh-CN" altLang="en-US" smtClean="0"/>
-              <a:t>2022/2/19</a:t>
             </a:fld>
             <a:endParaRPr lang="zh-CN" altLang="en-US"/>
           </a:p>
@@ -3350,7 +3419,6 @@
           <a:p>
             <a:fld id="{8EAC17D0-B82B-4518-9083-C784B5308AA6}" type="slidenum">
               <a:rPr lang="zh-CN" altLang="en-US" smtClean="0"/>
-              <a:t>‹#›</a:t>
             </a:fld>
             <a:endParaRPr lang="zh-CN" altLang="en-US"/>
           </a:p>
@@ -3409,6 +3477,7 @@
               <a:rPr lang="zh-CN" altLang="en-US"/>
               <a:t>单击此处编辑母版标题样式</a:t>
             </a:r>
+            <a:endParaRPr lang="zh-CN" altLang="en-US"/>
           </a:p>
         </p:txBody>
       </p:sp>
@@ -3465,6 +3534,7 @@
               <a:rPr lang="zh-CN" altLang="en-US"/>
               <a:t>单击此处编辑母版文本样式</a:t>
             </a:r>
+            <a:endParaRPr lang="zh-CN" altLang="en-US"/>
           </a:p>
           <a:p>
             <a:pPr lvl="1"/>
@@ -3472,6 +3542,7 @@
               <a:rPr lang="zh-CN" altLang="en-US"/>
               <a:t>第二级</a:t>
             </a:r>
+            <a:endParaRPr lang="zh-CN" altLang="en-US"/>
           </a:p>
           <a:p>
             <a:pPr lvl="2"/>
@@ -3479,6 +3550,7 @@
               <a:rPr lang="zh-CN" altLang="en-US"/>
               <a:t>第三级</a:t>
             </a:r>
+            <a:endParaRPr lang="zh-CN" altLang="en-US"/>
           </a:p>
           <a:p>
             <a:pPr lvl="3"/>
@@ -3486,6 +3558,7 @@
               <a:rPr lang="zh-CN" altLang="en-US"/>
               <a:t>第四级</a:t>
             </a:r>
+            <a:endParaRPr lang="zh-CN" altLang="en-US"/>
           </a:p>
           <a:p>
             <a:pPr lvl="4"/>
@@ -3493,6 +3566,7 @@
               <a:rPr lang="zh-CN" altLang="en-US"/>
               <a:t>第五级</a:t>
             </a:r>
+            <a:endParaRPr lang="zh-CN" altLang="en-US"/>
           </a:p>
         </p:txBody>
       </p:sp>
@@ -3558,6 +3632,7 @@
               <a:rPr lang="zh-CN" altLang="en-US"/>
               <a:t>单击此处编辑母版文本样式</a:t>
             </a:r>
+            <a:endParaRPr lang="zh-CN" altLang="en-US"/>
           </a:p>
         </p:txBody>
       </p:sp>
@@ -3578,7 +3653,6 @@
           <a:p>
             <a:fld id="{26843F14-D882-43D2-910D-7D4F87C69D2D}" type="datetimeFigureOut">
               <a:rPr lang="zh-CN" altLang="en-US" smtClean="0"/>
-              <a:t>2022/2/19</a:t>
             </a:fld>
             <a:endParaRPr lang="zh-CN" altLang="en-US"/>
           </a:p>
@@ -3620,7 +3694,6 @@
           <a:p>
             <a:fld id="{8EAC17D0-B82B-4518-9083-C784B5308AA6}" type="slidenum">
               <a:rPr lang="zh-CN" altLang="en-US" smtClean="0"/>
-              <a:t>‹#›</a:t>
             </a:fld>
             <a:endParaRPr lang="zh-CN" altLang="en-US"/>
           </a:p>
@@ -3679,6 +3752,7 @@
               <a:rPr lang="zh-CN" altLang="en-US"/>
               <a:t>单击此处编辑母版标题样式</a:t>
             </a:r>
+            <a:endParaRPr lang="zh-CN" altLang="en-US"/>
           </a:p>
         </p:txBody>
       </p:sp>
@@ -3805,6 +3879,7 @@
               <a:rPr lang="zh-CN" altLang="en-US"/>
               <a:t>单击此处编辑母版文本样式</a:t>
             </a:r>
+            <a:endParaRPr lang="zh-CN" altLang="en-US"/>
           </a:p>
         </p:txBody>
       </p:sp>
@@ -3825,7 +3900,6 @@
           <a:p>
             <a:fld id="{26843F14-D882-43D2-910D-7D4F87C69D2D}" type="datetimeFigureOut">
               <a:rPr lang="zh-CN" altLang="en-US" smtClean="0"/>
-              <a:t>2022/2/19</a:t>
             </a:fld>
             <a:endParaRPr lang="zh-CN" altLang="en-US"/>
           </a:p>
@@ -3867,7 +3941,6 @@
           <a:p>
             <a:fld id="{8EAC17D0-B82B-4518-9083-C784B5308AA6}" type="slidenum">
               <a:rPr lang="zh-CN" altLang="en-US" smtClean="0"/>
-              <a:t>‹#›</a:t>
             </a:fld>
             <a:endParaRPr lang="zh-CN" altLang="en-US"/>
           </a:p>
@@ -3932,6 +4005,7 @@
               <a:rPr lang="zh-CN" altLang="en-US"/>
               <a:t>单击此处编辑母版标题样式</a:t>
             </a:r>
+            <a:endParaRPr lang="zh-CN" altLang="en-US"/>
           </a:p>
         </p:txBody>
       </p:sp>
@@ -3965,6 +4039,7 @@
               <a:rPr lang="zh-CN" altLang="en-US"/>
               <a:t>单击此处编辑母版文本样式</a:t>
             </a:r>
+            <a:endParaRPr lang="zh-CN" altLang="en-US"/>
           </a:p>
           <a:p>
             <a:pPr lvl="1"/>
@@ -3972,6 +4047,7 @@
               <a:rPr lang="zh-CN" altLang="en-US"/>
               <a:t>第二级</a:t>
             </a:r>
+            <a:endParaRPr lang="zh-CN" altLang="en-US"/>
           </a:p>
           <a:p>
             <a:pPr lvl="2"/>
@@ -3979,6 +4055,7 @@
               <a:rPr lang="zh-CN" altLang="en-US"/>
               <a:t>第三级</a:t>
             </a:r>
+            <a:endParaRPr lang="zh-CN" altLang="en-US"/>
           </a:p>
           <a:p>
             <a:pPr lvl="3"/>
@@ -3986,6 +4063,7 @@
               <a:rPr lang="zh-CN" altLang="en-US"/>
               <a:t>第四级</a:t>
             </a:r>
+            <a:endParaRPr lang="zh-CN" altLang="en-US"/>
           </a:p>
           <a:p>
             <a:pPr lvl="4"/>
@@ -3993,6 +4071,7 @@
               <a:rPr lang="zh-CN" altLang="en-US"/>
               <a:t>第五级</a:t>
             </a:r>
+            <a:endParaRPr lang="zh-CN" altLang="en-US"/>
           </a:p>
         </p:txBody>
       </p:sp>
@@ -4031,7 +4110,6 @@
           <a:p>
             <a:fld id="{26843F14-D882-43D2-910D-7D4F87C69D2D}" type="datetimeFigureOut">
               <a:rPr lang="zh-CN" altLang="en-US" smtClean="0"/>
-              <a:t>2022/2/19</a:t>
             </a:fld>
             <a:endParaRPr lang="zh-CN" altLang="en-US"/>
           </a:p>
@@ -4109,7 +4187,6 @@
           <a:p>
             <a:fld id="{8EAC17D0-B82B-4518-9083-C784B5308AA6}" type="slidenum">
               <a:rPr lang="zh-CN" altLang="en-US" smtClean="0"/>
-              <a:t>‹#›</a:t>
             </a:fld>
             <a:endParaRPr lang="zh-CN" altLang="en-US"/>
           </a:p>
@@ -4410,7 +4487,7 @@
           <p:nvPr/>
         </p:nvPicPr>
         <p:blipFill rotWithShape="1">
-          <a:blip r:embed="rId3" cstate="print">
+          <a:blip r:embed="rId1" cstate="print">
             <a:extLst>
               <a:ext uri="{28A0092B-C50C-407E-A947-70E740481C1C}">
                 <a14:useLocalDpi xmlns:a14="http://schemas.microsoft.com/office/drawing/2010/main" val="0"/>
@@ -4477,6 +4554,16 @@
               </a:rPr>
               <a:t>观察者模式</a:t>
             </a:r>
+            <a:endParaRPr lang="zh-CN" altLang="en-US" sz="5000" b="1" dirty="0">
+              <a:solidFill>
+                <a:schemeClr val="tx1">
+                  <a:lumMod val="65000"/>
+                  <a:lumOff val="35000"/>
+                </a:schemeClr>
+              </a:solidFill>
+              <a:latin typeface="微软雅黑" panose="020B0503020204020204" pitchFamily="34" charset="-122"/>
+              <a:ea typeface="微软雅黑" panose="020B0503020204020204" pitchFamily="34" charset="-122"/>
+            </a:endParaRPr>
           </a:p>
         </p:txBody>
       </p:sp>
@@ -4685,7 +4772,7 @@
           <p:nvPr/>
         </p:nvPicPr>
         <p:blipFill>
-          <a:blip r:embed="rId4" cstate="print">
+          <a:blip r:embed="rId2" cstate="print">
             <a:extLst>
               <a:ext uri="{28A0092B-C50C-407E-A947-70E740481C1C}">
                 <a14:useLocalDpi xmlns:a14="http://schemas.microsoft.com/office/drawing/2010/main" val="0"/>
@@ -4774,6 +4861,13 @@
               </a:rPr>
               <a:t>小结</a:t>
             </a:r>
+            <a:endParaRPr lang="zh-CN" altLang="en-US" sz="2000" b="1" dirty="0">
+              <a:solidFill>
+                <a:srgbClr val="717171"/>
+              </a:solidFill>
+              <a:latin typeface="微软雅黑" panose="020B0503020204020204" pitchFamily="34" charset="-122"/>
+              <a:ea typeface="微软雅黑" panose="020B0503020204020204" pitchFamily="34" charset="-122"/>
+            </a:endParaRPr>
           </a:p>
         </p:txBody>
       </p:sp>
@@ -4786,7 +4880,7 @@
           <p:nvPr/>
         </p:nvPicPr>
         <p:blipFill rotWithShape="1">
-          <a:blip r:embed="rId3" cstate="print">
+          <a:blip r:embed="rId1" cstate="print">
             <a:extLst>
               <a:ext uri="{28A0092B-C50C-407E-A947-70E740481C1C}">
                 <a14:useLocalDpi xmlns:a14="http://schemas.microsoft.com/office/drawing/2010/main" val="0"/>
@@ -4827,7 +4921,7 @@
           <p:nvPr/>
         </p:nvPicPr>
         <p:blipFill>
-          <a:blip r:embed="rId4" cstate="print">
+          <a:blip r:embed="rId2" cstate="print">
             <a:extLst>
               <a:ext uri="{28A0092B-C50C-407E-A947-70E740481C1C}">
                 <a14:useLocalDpi xmlns:a14="http://schemas.microsoft.com/office/drawing/2010/main" val="0"/>
@@ -5004,6 +5098,12 @@
               </a:rPr>
               <a:t>观察者被动接受被观察者的通知，无需主动询问。</a:t>
             </a:r>
+            <a:endParaRPr lang="zh-CN" altLang="en-US" sz="1400" dirty="0">
+              <a:solidFill>
+                <a:srgbClr val="444444"/>
+              </a:solidFill>
+              <a:latin typeface="PT Sans" panose="020B0503020203020204" pitchFamily="34" charset="0"/>
+            </a:endParaRPr>
           </a:p>
           <a:p>
             <a:pPr marL="342900" indent="-342900">
@@ -5158,8 +5258,36 @@
                 <a:latin typeface="微软雅黑" panose="020B0503020204020204" pitchFamily="34" charset="-122"/>
                 <a:ea typeface="微软雅黑" panose="020B0503020204020204" pitchFamily="34" charset="-122"/>
               </a:rPr>
-              <a:t>与订阅模式</a:t>
-            </a:r>
+              <a:t>订阅模式</a:t>
+            </a:r>
+            <a:r>
+              <a:rPr lang="zh-CN" altLang="en-US" sz="2000" b="1" dirty="0">
+                <a:solidFill>
+                  <a:srgbClr val="717171"/>
+                </a:solidFill>
+                <a:latin typeface="微软雅黑" panose="020B0503020204020204" pitchFamily="34" charset="-122"/>
+                <a:ea typeface="微软雅黑" panose="020B0503020204020204" pitchFamily="34" charset="-122"/>
+                <a:sym typeface="+mn-ea"/>
+              </a:rPr>
+              <a:t>—</a:t>
+            </a:r>
+            <a:r>
+              <a:rPr lang="zh-CN" altLang="en-US" sz="2000" b="1" dirty="0">
+                <a:solidFill>
+                  <a:srgbClr val="717171"/>
+                </a:solidFill>
+                <a:latin typeface="微软雅黑" panose="020B0503020204020204" pitchFamily="34" charset="-122"/>
+                <a:ea typeface="微软雅黑" panose="020B0503020204020204" pitchFamily="34" charset="-122"/>
+              </a:rPr>
+              <a:t>实现</a:t>
+            </a:r>
+            <a:endParaRPr lang="zh-CN" altLang="en-US" sz="2000" b="1" dirty="0">
+              <a:solidFill>
+                <a:srgbClr val="717171"/>
+              </a:solidFill>
+              <a:latin typeface="微软雅黑" panose="020B0503020204020204" pitchFamily="34" charset="-122"/>
+              <a:ea typeface="微软雅黑" panose="020B0503020204020204" pitchFamily="34" charset="-122"/>
+            </a:endParaRPr>
           </a:p>
         </p:txBody>
       </p:sp>
@@ -5172,7 +5300,7 @@
           <p:nvPr/>
         </p:nvPicPr>
         <p:blipFill rotWithShape="1">
-          <a:blip r:embed="rId3" cstate="print">
+          <a:blip r:embed="rId1" cstate="print">
             <a:extLst>
               <a:ext uri="{28A0092B-C50C-407E-A947-70E740481C1C}">
                 <a14:useLocalDpi xmlns:a14="http://schemas.microsoft.com/office/drawing/2010/main" val="0"/>
@@ -5213,7 +5341,7 @@
           <p:nvPr/>
         </p:nvPicPr>
         <p:blipFill>
-          <a:blip r:embed="rId4" cstate="print">
+          <a:blip r:embed="rId2" cstate="print">
             <a:extLst>
               <a:ext uri="{28A0092B-C50C-407E-A947-70E740481C1C}">
                 <a14:useLocalDpi xmlns:a14="http://schemas.microsoft.com/office/drawing/2010/main" val="0"/>
@@ -5247,13 +5375,7 @@
       </p:pic>
       <p:sp>
         <p:nvSpPr>
-          <p:cNvPr id="3" name="AutoShape 2">
-            <a:extLst>
-              <a:ext uri="{FF2B5EF4-FFF2-40B4-BE49-F238E27FC236}">
-                <a16:creationId xmlns:a16="http://schemas.microsoft.com/office/drawing/2014/main" id="{94D9B076-B8CF-4081-887E-B4B2E28D40AC}"/>
-              </a:ext>
-            </a:extLst>
-          </p:cNvPr>
+          <p:cNvPr id="3" name="AutoShape 2"/>
           <p:cNvSpPr>
             <a:spLocks noChangeAspect="1" noChangeArrowheads="1"/>
           </p:cNvSpPr>
@@ -5279,26 +5401,16 @@
           </a:extLst>
         </p:spPr>
         <p:txBody>
-          <a:bodyPr vert="horz" wrap="square" lIns="91440" tIns="45720" rIns="91440" bIns="45720" numCol="1" anchor="t" anchorCtr="0" compatLnSpc="1">
-            <a:prstTxWarp prst="textNoShape">
-              <a:avLst/>
-            </a:prstTxWarp>
-          </a:bodyPr>
-          <a:lstStyle/>
-          <a:p>
-            <a:endParaRPr lang="zh-CN" altLang="en-US"/>
-          </a:p>
-        </p:txBody>
-      </p:sp>
-      <p:sp>
-        <p:nvSpPr>
-          <p:cNvPr id="4" name="AutoShape 4">
-            <a:extLst>
-              <a:ext uri="{FF2B5EF4-FFF2-40B4-BE49-F238E27FC236}">
-                <a16:creationId xmlns:a16="http://schemas.microsoft.com/office/drawing/2014/main" id="{74879F89-7A50-4C41-9DEE-E22C5A9C90E3}"/>
-              </a:ext>
-            </a:extLst>
-          </p:cNvPr>
+          <a:bodyPr vert="horz" wrap="square" lIns="91440" tIns="45720" rIns="91440" bIns="45720" numCol="1" anchor="t" anchorCtr="0" compatLnSpc="1"/>
+          <a:lstStyle/>
+          <a:p>
+            <a:endParaRPr lang="zh-CN" altLang="en-US"/>
+          </a:p>
+        </p:txBody>
+      </p:sp>
+      <p:sp>
+        <p:nvSpPr>
+          <p:cNvPr id="4" name="AutoShape 4"/>
           <p:cNvSpPr>
             <a:spLocks noChangeAspect="1" noChangeArrowheads="1"/>
           </p:cNvSpPr>
@@ -5324,11 +5436,7 @@
           </a:extLst>
         </p:spPr>
         <p:txBody>
-          <a:bodyPr vert="horz" wrap="square" lIns="91440" tIns="45720" rIns="91440" bIns="45720" numCol="1" anchor="t" anchorCtr="0" compatLnSpc="1">
-            <a:prstTxWarp prst="textNoShape">
-              <a:avLst/>
-            </a:prstTxWarp>
-          </a:bodyPr>
+          <a:bodyPr vert="horz" wrap="square" lIns="91440" tIns="45720" rIns="91440" bIns="45720" numCol="1" anchor="t" anchorCtr="0" compatLnSpc="1"/>
           <a:lstStyle/>
           <a:p>
             <a:endParaRPr lang="zh-CN" altLang="en-US"/>
@@ -5337,20 +5445,14 @@
       </p:sp>
       <p:pic>
         <p:nvPicPr>
-          <p:cNvPr id="13" name="图片 12">
-            <a:extLst>
-              <a:ext uri="{FF2B5EF4-FFF2-40B4-BE49-F238E27FC236}">
-                <a16:creationId xmlns:a16="http://schemas.microsoft.com/office/drawing/2014/main" id="{DF8AC0AD-34FC-455B-B568-2C2F1132619D}"/>
-              </a:ext>
-            </a:extLst>
-          </p:cNvPr>
+          <p:cNvPr id="13" name="图片 12"/>
           <p:cNvPicPr>
             <a:picLocks noChangeAspect="1"/>
           </p:cNvPicPr>
           <p:nvPr/>
         </p:nvPicPr>
         <p:blipFill>
-          <a:blip r:embed="rId5"/>
+          <a:blip r:embed="rId3"/>
           <a:stretch>
             <a:fillRect/>
           </a:stretch>
@@ -5367,20 +5469,14 @@
       </p:pic>
       <p:sp>
         <p:nvSpPr>
-          <p:cNvPr id="14" name="文本框 13">
-            <a:extLst>
-              <a:ext uri="{FF2B5EF4-FFF2-40B4-BE49-F238E27FC236}">
-                <a16:creationId xmlns:a16="http://schemas.microsoft.com/office/drawing/2014/main" id="{2EEA55B5-0C05-4072-94B4-B08CE2ADC677}"/>
-              </a:ext>
-            </a:extLst>
-          </p:cNvPr>
+          <p:cNvPr id="14" name="文本框 13"/>
           <p:cNvSpPr txBox="1"/>
           <p:nvPr/>
         </p:nvSpPr>
         <p:spPr>
           <a:xfrm>
             <a:off x="345396" y="1348888"/>
-            <a:ext cx="5937844" cy="523220"/>
+            <a:ext cx="7146290" cy="521970"/>
           </a:xfrm>
           <a:prstGeom prst="rect">
             <a:avLst/>
@@ -5399,7 +5495,7 @@
             </a:r>
             <a:r>
               <a:rPr lang="zh-CN" altLang="en-US" sz="1400" dirty="0"/>
-              <a:t>不会将消息直接发送给特定的接收者，而是通过消息通道广播，</a:t>
+              <a:t>不会将消息直接发送给特定的接收者，而是通过消息通道广播（或者中间件），</a:t>
             </a:r>
             <a:endParaRPr lang="en-US" altLang="zh-CN" sz="1400" dirty="0"/>
           </a:p>
@@ -5408,6 +5504,7 @@
               <a:rPr lang="zh-CN" altLang="en-US" sz="1400" dirty="0"/>
               <a:t>让订阅者消费该消息。</a:t>
             </a:r>
+            <a:endParaRPr lang="zh-CN" altLang="en-US" sz="1400" dirty="0"/>
           </a:p>
         </p:txBody>
       </p:sp>
@@ -5466,8 +5563,15 @@
                 <a:latin typeface="微软雅黑" panose="020B0503020204020204" pitchFamily="34" charset="-122"/>
                 <a:ea typeface="微软雅黑" panose="020B0503020204020204" pitchFamily="34" charset="-122"/>
               </a:rPr>
-              <a:t>与订阅模式</a:t>
-            </a:r>
+              <a:t>订阅模式—实现</a:t>
+            </a:r>
+            <a:endParaRPr lang="zh-CN" altLang="en-US" sz="2000" b="1" dirty="0">
+              <a:solidFill>
+                <a:srgbClr val="717171"/>
+              </a:solidFill>
+              <a:latin typeface="微软雅黑" panose="020B0503020204020204" pitchFamily="34" charset="-122"/>
+              <a:ea typeface="微软雅黑" panose="020B0503020204020204" pitchFamily="34" charset="-122"/>
+            </a:endParaRPr>
           </a:p>
         </p:txBody>
       </p:sp>
@@ -5480,7 +5584,7 @@
           <p:nvPr/>
         </p:nvPicPr>
         <p:blipFill rotWithShape="1">
-          <a:blip r:embed="rId3" cstate="print">
+          <a:blip r:embed="rId1" cstate="print">
             <a:extLst>
               <a:ext uri="{28A0092B-C50C-407E-A947-70E740481C1C}">
                 <a14:useLocalDpi xmlns:a14="http://schemas.microsoft.com/office/drawing/2010/main" val="0"/>
@@ -5521,7 +5625,7 @@
           <p:nvPr/>
         </p:nvPicPr>
         <p:blipFill>
-          <a:blip r:embed="rId4" cstate="print">
+          <a:blip r:embed="rId2" cstate="print">
             <a:extLst>
               <a:ext uri="{28A0092B-C50C-407E-A947-70E740481C1C}">
                 <a14:useLocalDpi xmlns:a14="http://schemas.microsoft.com/office/drawing/2010/main" val="0"/>
@@ -5555,13 +5659,7 @@
       </p:pic>
       <p:sp>
         <p:nvSpPr>
-          <p:cNvPr id="3" name="AutoShape 2">
-            <a:extLst>
-              <a:ext uri="{FF2B5EF4-FFF2-40B4-BE49-F238E27FC236}">
-                <a16:creationId xmlns:a16="http://schemas.microsoft.com/office/drawing/2014/main" id="{94D9B076-B8CF-4081-887E-B4B2E28D40AC}"/>
-              </a:ext>
-            </a:extLst>
-          </p:cNvPr>
+          <p:cNvPr id="3" name="AutoShape 2"/>
           <p:cNvSpPr>
             <a:spLocks noChangeAspect="1" noChangeArrowheads="1"/>
           </p:cNvSpPr>
@@ -5587,26 +5685,16 @@
           </a:extLst>
         </p:spPr>
         <p:txBody>
-          <a:bodyPr vert="horz" wrap="square" lIns="91440" tIns="45720" rIns="91440" bIns="45720" numCol="1" anchor="t" anchorCtr="0" compatLnSpc="1">
-            <a:prstTxWarp prst="textNoShape">
-              <a:avLst/>
-            </a:prstTxWarp>
-          </a:bodyPr>
-          <a:lstStyle/>
-          <a:p>
-            <a:endParaRPr lang="zh-CN" altLang="en-US"/>
-          </a:p>
-        </p:txBody>
-      </p:sp>
-      <p:sp>
-        <p:nvSpPr>
-          <p:cNvPr id="4" name="AutoShape 4">
-            <a:extLst>
-              <a:ext uri="{FF2B5EF4-FFF2-40B4-BE49-F238E27FC236}">
-                <a16:creationId xmlns:a16="http://schemas.microsoft.com/office/drawing/2014/main" id="{74879F89-7A50-4C41-9DEE-E22C5A9C90E3}"/>
-              </a:ext>
-            </a:extLst>
-          </p:cNvPr>
+          <a:bodyPr vert="horz" wrap="square" lIns="91440" tIns="45720" rIns="91440" bIns="45720" numCol="1" anchor="t" anchorCtr="0" compatLnSpc="1"/>
+          <a:lstStyle/>
+          <a:p>
+            <a:endParaRPr lang="zh-CN" altLang="en-US"/>
+          </a:p>
+        </p:txBody>
+      </p:sp>
+      <p:sp>
+        <p:nvSpPr>
+          <p:cNvPr id="4" name="AutoShape 4"/>
           <p:cNvSpPr>
             <a:spLocks noChangeAspect="1" noChangeArrowheads="1"/>
           </p:cNvSpPr>
@@ -5632,340 +5720,14 @@
           </a:extLst>
         </p:spPr>
         <p:txBody>
-          <a:bodyPr vert="horz" wrap="square" lIns="91440" tIns="45720" rIns="91440" bIns="45720" numCol="1" anchor="t" anchorCtr="0" compatLnSpc="1">
-            <a:prstTxWarp prst="textNoShape">
-              <a:avLst/>
-            </a:prstTxWarp>
-          </a:bodyPr>
-          <a:lstStyle/>
-          <a:p>
-            <a:endParaRPr lang="zh-CN" altLang="en-US"/>
-          </a:p>
-        </p:txBody>
-      </p:sp>
-      <p:sp>
-        <p:nvSpPr>
-          <p:cNvPr id="14" name="文本框 13">
-            <a:extLst>
-              <a:ext uri="{FF2B5EF4-FFF2-40B4-BE49-F238E27FC236}">
-                <a16:creationId xmlns:a16="http://schemas.microsoft.com/office/drawing/2014/main" id="{2EEA55B5-0C05-4072-94B4-B08CE2ADC677}"/>
-              </a:ext>
-            </a:extLst>
-          </p:cNvPr>
-          <p:cNvSpPr txBox="1"/>
-          <p:nvPr/>
-        </p:nvSpPr>
-        <p:spPr>
-          <a:xfrm>
-            <a:off x="345396" y="1219021"/>
-            <a:ext cx="6800260" cy="1938992"/>
-          </a:xfrm>
-          <a:prstGeom prst="rect">
-            <a:avLst/>
-          </a:prstGeom>
-          <a:noFill/>
-        </p:spPr>
-        <p:txBody>
-          <a:bodyPr wrap="none" rtlCol="0">
-            <a:spAutoFit/>
-          </a:bodyPr>
-          <a:lstStyle/>
-          <a:p>
-            <a:r>
-              <a:rPr lang="zh-CN" altLang="en-US" dirty="0"/>
-              <a:t>区别：</a:t>
-            </a:r>
-            <a:endParaRPr lang="en-US" altLang="zh-CN" dirty="0"/>
-          </a:p>
-          <a:p>
-            <a:endParaRPr lang="en-US" altLang="zh-CN" dirty="0"/>
-          </a:p>
-          <a:p>
-            <a:r>
-              <a:rPr lang="en-US" altLang="zh-CN" sz="1200" b="0" i="0" dirty="0">
-                <a:solidFill>
-                  <a:srgbClr val="333333"/>
-                </a:solidFill>
-                <a:effectLst/>
-                <a:latin typeface="pingfang SC"/>
-              </a:rPr>
-              <a:t>1. </a:t>
-            </a:r>
-            <a:r>
-              <a:rPr lang="zh-CN" altLang="en-US" sz="1200" b="1" i="0" dirty="0">
-                <a:solidFill>
-                  <a:srgbClr val="333333"/>
-                </a:solidFill>
-                <a:effectLst/>
-                <a:latin typeface="pingfang SC"/>
-              </a:rPr>
-              <a:t>耦合</a:t>
-            </a:r>
-            <a:r>
-              <a:rPr lang="zh-CN" altLang="en-US" sz="1200" b="0" i="0" dirty="0">
-                <a:solidFill>
-                  <a:srgbClr val="333333"/>
-                </a:solidFill>
-                <a:effectLst/>
-                <a:latin typeface="pingfang SC"/>
-              </a:rPr>
-              <a:t>：在观察者模式中，被观察者和观察者松散耦合；在订阅模式中，组件与订阅者完全分离。</a:t>
-            </a:r>
-            <a:endParaRPr lang="en-US" altLang="zh-CN" sz="1200" b="0" i="0" dirty="0">
-              <a:solidFill>
-                <a:srgbClr val="333333"/>
-              </a:solidFill>
-              <a:effectLst/>
-              <a:latin typeface="pingfang SC"/>
-            </a:endParaRPr>
-          </a:p>
-          <a:p>
-            <a:r>
-              <a:rPr lang="en-US" altLang="zh-CN" sz="1200" b="0" i="0" dirty="0">
-                <a:solidFill>
-                  <a:srgbClr val="333333"/>
-                </a:solidFill>
-                <a:effectLst/>
-                <a:latin typeface="pingfang SC"/>
-              </a:rPr>
-              <a:t>2. </a:t>
-            </a:r>
-            <a:r>
-              <a:rPr lang="zh-CN" altLang="en-US" sz="1200" b="1" i="0" dirty="0">
-                <a:solidFill>
-                  <a:srgbClr val="333333"/>
-                </a:solidFill>
-                <a:effectLst/>
-                <a:latin typeface="pingfang SC"/>
-              </a:rPr>
-              <a:t>通知</a:t>
-            </a:r>
-            <a:r>
-              <a:rPr lang="zh-CN" altLang="en-US" sz="1200" b="0" i="0" dirty="0">
-                <a:solidFill>
-                  <a:srgbClr val="333333"/>
-                </a:solidFill>
-                <a:effectLst/>
-                <a:latin typeface="pingfang SC"/>
-              </a:rPr>
-              <a:t>：在观察者模式中，被观察者知道如何通知观察者；在发布</a:t>
-            </a:r>
-            <a:r>
-              <a:rPr lang="en-US" altLang="zh-CN" sz="1200" b="0" i="0" dirty="0">
-                <a:solidFill>
-                  <a:srgbClr val="333333"/>
-                </a:solidFill>
-                <a:effectLst/>
-                <a:latin typeface="pingfang SC"/>
-              </a:rPr>
-              <a:t>/</a:t>
-            </a:r>
-            <a:r>
-              <a:rPr lang="zh-CN" altLang="en-US" sz="1200" b="0" i="0" dirty="0">
-                <a:solidFill>
-                  <a:srgbClr val="333333"/>
-                </a:solidFill>
-                <a:effectLst/>
-                <a:latin typeface="pingfang SC"/>
-              </a:rPr>
-              <a:t>订阅模式中，</a:t>
-            </a:r>
-            <a:r>
-              <a:rPr lang="en-US" altLang="zh-CN" sz="1200" b="0" i="0" dirty="0">
-                <a:solidFill>
-                  <a:srgbClr val="333333"/>
-                </a:solidFill>
-                <a:effectLst/>
-                <a:latin typeface="pingfang SC"/>
-              </a:rPr>
-              <a:t> </a:t>
-            </a:r>
-            <a:r>
-              <a:rPr lang="zh-CN" altLang="en-US" sz="1200" b="0" i="0" dirty="0">
-                <a:solidFill>
-                  <a:srgbClr val="333333"/>
-                </a:solidFill>
-                <a:effectLst/>
-                <a:latin typeface="pingfang SC"/>
-              </a:rPr>
-              <a:t>发布者</a:t>
-            </a:r>
-            <a:r>
-              <a:rPr lang="zh-CN" altLang="en-US" sz="1200" dirty="0">
-                <a:solidFill>
-                  <a:srgbClr val="333333"/>
-                </a:solidFill>
-                <a:latin typeface="pingfang SC"/>
-              </a:rPr>
-              <a:t>对</a:t>
-            </a:r>
-            <a:r>
-              <a:rPr lang="zh-CN" altLang="en-US" sz="1200" b="0" i="0" dirty="0">
-                <a:solidFill>
-                  <a:srgbClr val="333333"/>
-                </a:solidFill>
-                <a:effectLst/>
-                <a:latin typeface="pingfang SC"/>
-              </a:rPr>
-              <a:t>订阅者</a:t>
-            </a:r>
-            <a:endParaRPr lang="en-US" altLang="zh-CN" sz="1200" b="0" i="0" dirty="0">
-              <a:solidFill>
-                <a:srgbClr val="333333"/>
-              </a:solidFill>
-              <a:effectLst/>
-              <a:latin typeface="pingfang SC"/>
-            </a:endParaRPr>
-          </a:p>
-          <a:p>
-            <a:r>
-              <a:rPr lang="en-US" altLang="zh-CN" sz="1200" dirty="0">
-                <a:solidFill>
-                  <a:srgbClr val="333333"/>
-                </a:solidFill>
-                <a:latin typeface="pingfang SC"/>
-              </a:rPr>
-              <a:t>    </a:t>
-            </a:r>
-            <a:r>
-              <a:rPr lang="zh-CN" altLang="en-US" sz="1200" b="0" i="0" dirty="0">
-                <a:solidFill>
-                  <a:srgbClr val="333333"/>
-                </a:solidFill>
-                <a:effectLst/>
-                <a:latin typeface="pingfang SC"/>
-              </a:rPr>
-              <a:t>一无所知，它们只需在消息代理的帮助下进行通信。</a:t>
-            </a:r>
-            <a:endParaRPr lang="en-US" altLang="zh-CN" sz="1200" b="0" i="0" dirty="0">
-              <a:solidFill>
-                <a:srgbClr val="333333"/>
-              </a:solidFill>
-              <a:effectLst/>
-              <a:latin typeface="pingfang SC"/>
-            </a:endParaRPr>
-          </a:p>
-          <a:p>
-            <a:r>
-              <a:rPr lang="en-US" altLang="zh-CN" sz="1200" dirty="0">
-                <a:solidFill>
-                  <a:srgbClr val="333333"/>
-                </a:solidFill>
-                <a:latin typeface="pingfang SC"/>
-              </a:rPr>
-              <a:t>3. </a:t>
-            </a:r>
-            <a:r>
-              <a:rPr lang="zh-CN" altLang="en-US" sz="1200" b="1" dirty="0">
-                <a:solidFill>
-                  <a:srgbClr val="333333"/>
-                </a:solidFill>
-                <a:latin typeface="pingfang SC"/>
-              </a:rPr>
-              <a:t>异步</a:t>
-            </a:r>
-            <a:r>
-              <a:rPr lang="zh-CN" altLang="en-US" sz="1200" dirty="0">
-                <a:solidFill>
-                  <a:srgbClr val="333333"/>
-                </a:solidFill>
-                <a:latin typeface="pingfang SC"/>
-              </a:rPr>
-              <a:t>：</a:t>
-            </a:r>
-            <a:r>
-              <a:rPr lang="zh-CN" altLang="en-US" sz="1200" b="0" i="0" dirty="0">
-                <a:solidFill>
-                  <a:srgbClr val="333333"/>
-                </a:solidFill>
-                <a:effectLst/>
-                <a:latin typeface="pingfang SC"/>
-              </a:rPr>
-              <a:t>观察者模式主要是以同步方式发布消息</a:t>
-            </a:r>
-            <a:r>
-              <a:rPr lang="zh-CN" altLang="en-US" sz="1200" dirty="0">
-                <a:solidFill>
-                  <a:srgbClr val="333333"/>
-                </a:solidFill>
-                <a:latin typeface="pingfang SC"/>
-              </a:rPr>
-              <a:t>；</a:t>
-            </a:r>
-            <a:r>
-              <a:rPr lang="zh-CN" altLang="en-US" sz="1200" b="0" i="0" dirty="0">
-                <a:solidFill>
-                  <a:srgbClr val="333333"/>
-                </a:solidFill>
-                <a:effectLst/>
-                <a:latin typeface="pingfang SC"/>
-              </a:rPr>
-              <a:t>订阅模式通过消息代理实现异步发布消息。</a:t>
-            </a:r>
-            <a:endParaRPr lang="en-US" altLang="zh-CN" sz="1200" b="0" i="0" dirty="0">
-              <a:solidFill>
-                <a:srgbClr val="333333"/>
-              </a:solidFill>
-              <a:effectLst/>
-              <a:latin typeface="pingfang SC"/>
-            </a:endParaRPr>
-          </a:p>
-          <a:p>
-            <a:endParaRPr lang="zh-CN" altLang="en-US" b="0" i="0" dirty="0">
-              <a:solidFill>
-                <a:srgbClr val="333333"/>
-              </a:solidFill>
-              <a:effectLst/>
-              <a:latin typeface="pingfang SC"/>
-            </a:endParaRPr>
-          </a:p>
-          <a:p>
-            <a:endParaRPr lang="zh-CN" altLang="en-US" dirty="0"/>
-          </a:p>
-        </p:txBody>
-      </p:sp>
-      <p:pic>
-        <p:nvPicPr>
-          <p:cNvPr id="9" name="图片 8">
-            <a:extLst>
-              <a:ext uri="{FF2B5EF4-FFF2-40B4-BE49-F238E27FC236}">
-                <a16:creationId xmlns:a16="http://schemas.microsoft.com/office/drawing/2014/main" id="{7C222BC2-180F-427B-A81B-04964579CA48}"/>
-              </a:ext>
-            </a:extLst>
-          </p:cNvPr>
-          <p:cNvPicPr>
-            <a:picLocks noChangeAspect="1"/>
-          </p:cNvPicPr>
-          <p:nvPr/>
-        </p:nvPicPr>
-        <p:blipFill>
-          <a:blip r:embed="rId5">
-            <a:extLst>
-              <a:ext uri="{28A0092B-C50C-407E-A947-70E740481C1C}">
-                <a14:useLocalDpi xmlns:a14="http://schemas.microsoft.com/office/drawing/2010/main" val="0"/>
-              </a:ext>
-            </a:extLst>
-          </a:blip>
-          <a:stretch>
-            <a:fillRect/>
-          </a:stretch>
-        </p:blipFill>
-        <p:spPr>
-          <a:xfrm>
-            <a:off x="6262658" y="2900340"/>
-            <a:ext cx="2535946" cy="2010927"/>
-          </a:xfrm>
-          <a:prstGeom prst="rect">
-            <a:avLst/>
-          </a:prstGeom>
-        </p:spPr>
-      </p:pic>
+          <a:bodyPr vert="horz" wrap="square" lIns="91440" tIns="45720" rIns="91440" bIns="45720" numCol="1" anchor="t" anchorCtr="0" compatLnSpc="1"/>
+          <a:lstStyle/>
+          <a:p>
+            <a:endParaRPr lang="zh-CN" altLang="en-US"/>
+          </a:p>
+        </p:txBody>
+      </p:sp>
     </p:spTree>
-    <p:extLst>
-      <p:ext uri="{BB962C8B-B14F-4D97-AF65-F5344CB8AC3E}">
-        <p14:creationId xmlns:p14="http://schemas.microsoft.com/office/powerpoint/2010/main" val="3668815624"/>
-      </p:ext>
-    </p:extLst>
   </p:cSld>
   <p:clrMapOvr>
     <a:masterClrMapping/>
@@ -6020,8 +5782,36 @@
                 <a:latin typeface="微软雅黑" panose="020B0503020204020204" pitchFamily="34" charset="-122"/>
                 <a:ea typeface="微软雅黑" panose="020B0503020204020204" pitchFamily="34" charset="-122"/>
               </a:rPr>
-              <a:t>与订阅模式</a:t>
-            </a:r>
+              <a:t>订阅模式</a:t>
+            </a:r>
+            <a:r>
+              <a:rPr lang="zh-CN" altLang="en-US" sz="2000" b="1" dirty="0">
+                <a:solidFill>
+                  <a:srgbClr val="717171"/>
+                </a:solidFill>
+                <a:latin typeface="微软雅黑" panose="020B0503020204020204" pitchFamily="34" charset="-122"/>
+                <a:ea typeface="微软雅黑" panose="020B0503020204020204" pitchFamily="34" charset="-122"/>
+                <a:sym typeface="+mn-ea"/>
+              </a:rPr>
+              <a:t>—</a:t>
+            </a:r>
+            <a:r>
+              <a:rPr lang="zh-CN" altLang="en-US" sz="2000" b="1" dirty="0">
+                <a:solidFill>
+                  <a:srgbClr val="717171"/>
+                </a:solidFill>
+                <a:latin typeface="微软雅黑" panose="020B0503020204020204" pitchFamily="34" charset="-122"/>
+                <a:ea typeface="微软雅黑" panose="020B0503020204020204" pitchFamily="34" charset="-122"/>
+              </a:rPr>
+              <a:t>区别</a:t>
+            </a:r>
+            <a:endParaRPr lang="zh-CN" altLang="en-US" sz="2000" b="1" dirty="0">
+              <a:solidFill>
+                <a:srgbClr val="717171"/>
+              </a:solidFill>
+              <a:latin typeface="微软雅黑" panose="020B0503020204020204" pitchFamily="34" charset="-122"/>
+              <a:ea typeface="微软雅黑" panose="020B0503020204020204" pitchFamily="34" charset="-122"/>
+            </a:endParaRPr>
           </a:p>
         </p:txBody>
       </p:sp>
@@ -6034,7 +5824,7 @@
           <p:nvPr/>
         </p:nvPicPr>
         <p:blipFill rotWithShape="1">
-          <a:blip r:embed="rId3" cstate="print">
+          <a:blip r:embed="rId1" cstate="print">
             <a:extLst>
               <a:ext uri="{28A0092B-C50C-407E-A947-70E740481C1C}">
                 <a14:useLocalDpi xmlns:a14="http://schemas.microsoft.com/office/drawing/2010/main" val="0"/>
@@ -6075,7 +5865,7 @@
           <p:nvPr/>
         </p:nvPicPr>
         <p:blipFill>
-          <a:blip r:embed="rId4" cstate="print">
+          <a:blip r:embed="rId2" cstate="print">
             <a:extLst>
               <a:ext uri="{28A0092B-C50C-407E-A947-70E740481C1C}">
                 <a14:useLocalDpi xmlns:a14="http://schemas.microsoft.com/office/drawing/2010/main" val="0"/>
@@ -6109,13 +5899,7 @@
       </p:pic>
       <p:sp>
         <p:nvSpPr>
-          <p:cNvPr id="3" name="AutoShape 2">
-            <a:extLst>
-              <a:ext uri="{FF2B5EF4-FFF2-40B4-BE49-F238E27FC236}">
-                <a16:creationId xmlns:a16="http://schemas.microsoft.com/office/drawing/2014/main" id="{94D9B076-B8CF-4081-887E-B4B2E28D40AC}"/>
-              </a:ext>
-            </a:extLst>
-          </p:cNvPr>
+          <p:cNvPr id="3" name="AutoShape 2"/>
           <p:cNvSpPr>
             <a:spLocks noChangeAspect="1" noChangeArrowheads="1"/>
           </p:cNvSpPr>
@@ -6141,26 +5925,16 @@
           </a:extLst>
         </p:spPr>
         <p:txBody>
-          <a:bodyPr vert="horz" wrap="square" lIns="91440" tIns="45720" rIns="91440" bIns="45720" numCol="1" anchor="t" anchorCtr="0" compatLnSpc="1">
-            <a:prstTxWarp prst="textNoShape">
-              <a:avLst/>
-            </a:prstTxWarp>
-          </a:bodyPr>
-          <a:lstStyle/>
-          <a:p>
-            <a:endParaRPr lang="zh-CN" altLang="en-US"/>
-          </a:p>
-        </p:txBody>
-      </p:sp>
-      <p:sp>
-        <p:nvSpPr>
-          <p:cNvPr id="4" name="AutoShape 4">
-            <a:extLst>
-              <a:ext uri="{FF2B5EF4-FFF2-40B4-BE49-F238E27FC236}">
-                <a16:creationId xmlns:a16="http://schemas.microsoft.com/office/drawing/2014/main" id="{74879F89-7A50-4C41-9DEE-E22C5A9C90E3}"/>
-              </a:ext>
-            </a:extLst>
-          </p:cNvPr>
+          <a:bodyPr vert="horz" wrap="square" lIns="91440" tIns="45720" rIns="91440" bIns="45720" numCol="1" anchor="t" anchorCtr="0" compatLnSpc="1"/>
+          <a:lstStyle/>
+          <a:p>
+            <a:endParaRPr lang="zh-CN" altLang="en-US"/>
+          </a:p>
+        </p:txBody>
+      </p:sp>
+      <p:sp>
+        <p:nvSpPr>
+          <p:cNvPr id="4" name="AutoShape 4"/>
           <p:cNvSpPr>
             <a:spLocks noChangeAspect="1" noChangeArrowheads="1"/>
           </p:cNvSpPr>
@@ -6186,33 +5960,23 @@
           </a:extLst>
         </p:spPr>
         <p:txBody>
-          <a:bodyPr vert="horz" wrap="square" lIns="91440" tIns="45720" rIns="91440" bIns="45720" numCol="1" anchor="t" anchorCtr="0" compatLnSpc="1">
-            <a:prstTxWarp prst="textNoShape">
-              <a:avLst/>
-            </a:prstTxWarp>
-          </a:bodyPr>
-          <a:lstStyle/>
-          <a:p>
-            <a:endParaRPr lang="zh-CN" altLang="en-US"/>
-          </a:p>
-        </p:txBody>
-      </p:sp>
-      <p:sp>
-        <p:nvSpPr>
-          <p:cNvPr id="2" name="文本框 1">
-            <a:extLst>
-              <a:ext uri="{FF2B5EF4-FFF2-40B4-BE49-F238E27FC236}">
-                <a16:creationId xmlns:a16="http://schemas.microsoft.com/office/drawing/2014/main" id="{BAF8BEC0-86C4-4738-AEFB-C5EAA41934F3}"/>
-              </a:ext>
-            </a:extLst>
-          </p:cNvPr>
+          <a:bodyPr vert="horz" wrap="square" lIns="91440" tIns="45720" rIns="91440" bIns="45720" numCol="1" anchor="t" anchorCtr="0" compatLnSpc="1"/>
+          <a:lstStyle/>
+          <a:p>
+            <a:endParaRPr lang="zh-CN" altLang="en-US"/>
+          </a:p>
+        </p:txBody>
+      </p:sp>
+      <p:sp>
+        <p:nvSpPr>
+          <p:cNvPr id="14" name="文本框 13"/>
           <p:cNvSpPr txBox="1"/>
           <p:nvPr/>
         </p:nvSpPr>
         <p:spPr>
           <a:xfrm>
-            <a:off x="349740" y="1122224"/>
-            <a:ext cx="6455613" cy="2000548"/>
+            <a:off x="428581" y="1048841"/>
+            <a:ext cx="7887970" cy="1599565"/>
           </a:xfrm>
           <a:prstGeom prst="rect">
             <a:avLst/>
@@ -6226,19 +5990,24 @@
           <a:lstStyle/>
           <a:p>
             <a:r>
-              <a:rPr lang="zh-CN" altLang="en-US" b="1" dirty="0"/>
-              <a:t>优点：</a:t>
-            </a:r>
-            <a:endParaRPr lang="en-US" altLang="zh-CN" b="1" dirty="0"/>
-          </a:p>
-          <a:p>
-            <a:pPr marL="342900" indent="-342900">
-              <a:buFont typeface="+mj-lt"/>
-              <a:buAutoNum type="arabicPeriod"/>
-            </a:pPr>
-            <a:r>
-              <a:rPr lang="zh-CN" altLang="en-US" sz="1400" dirty="0"/>
-              <a:t>实现松耦合，使得发布、订阅者之间彻底分开，他们</a:t>
+              <a:rPr lang="en-US" altLang="zh-CN" sz="1400" b="0" i="0" dirty="0">
+                <a:solidFill>
+                  <a:srgbClr val="333333"/>
+                </a:solidFill>
+                <a:effectLst/>
+                <a:latin typeface="pingfang SC" panose="020B0400000000000000" charset="-122"/>
+              </a:rPr>
+              <a:t>1.  </a:t>
+            </a:r>
+            <a:r>
+              <a:rPr lang="zh-CN" altLang="en-US" sz="1400" b="1" i="0" dirty="0">
+                <a:solidFill>
+                  <a:srgbClr val="333333"/>
+                </a:solidFill>
+                <a:effectLst/>
+                <a:latin typeface="pingfang SC" panose="020B0400000000000000" charset="-122"/>
+              </a:rPr>
+              <a:t>耦合</a:t>
             </a:r>
             <a:r>
               <a:rPr lang="zh-CN" altLang="en-US" sz="1400" b="0" i="0" dirty="0">
@@ -6246,85 +6015,293 @@
                   <a:srgbClr val="333333"/>
                 </a:solidFill>
                 <a:effectLst/>
-                <a:latin typeface="pingfang SC"/>
-              </a:rPr>
-              <a:t>只需要遵守一份协议。</a:t>
-            </a:r>
-            <a:endParaRPr lang="en-US" altLang="zh-CN" sz="1400" dirty="0"/>
-          </a:p>
-          <a:p>
-            <a:pPr marL="342900" indent="-342900">
-              <a:buFont typeface="+mj-lt"/>
-              <a:buAutoNum type="arabicPeriod"/>
-            </a:pPr>
-            <a:r>
-              <a:rPr lang="zh-CN" altLang="en-US" sz="1400" dirty="0"/>
-              <a:t>异步消息不再阻塞发布进程。</a:t>
-            </a:r>
-            <a:endParaRPr lang="en-US" altLang="zh-CN" sz="1400" dirty="0"/>
-          </a:p>
-          <a:p>
-            <a:r>
-              <a:rPr lang="zh-CN" altLang="en-US" dirty="0"/>
+                <a:latin typeface="pingfang SC" panose="020B0400000000000000" charset="-122"/>
+              </a:rPr>
+              <a:t>：在观察者模式中，被观察者和观察者松散耦合；在订阅模式中，组件与订阅者完全分离。</a:t>
+            </a:r>
+            <a:endParaRPr lang="en-US" altLang="zh-CN" sz="1400" b="0" i="0" dirty="0">
+              <a:solidFill>
+                <a:srgbClr val="333333"/>
+              </a:solidFill>
+              <a:effectLst/>
+              <a:latin typeface="pingfang SC" panose="020B0400000000000000" charset="-122"/>
+            </a:endParaRPr>
+          </a:p>
+          <a:p>
+            <a:r>
+              <a:rPr lang="en-US" altLang="zh-CN" sz="1400" b="0" i="0" dirty="0">
+                <a:solidFill>
+                  <a:srgbClr val="333333"/>
+                </a:solidFill>
+                <a:effectLst/>
+                <a:latin typeface="pingfang SC" panose="020B0400000000000000" charset="-122"/>
+              </a:rPr>
+              <a:t>2. </a:t>
+            </a:r>
+            <a:r>
+              <a:rPr lang="zh-CN" altLang="en-US" sz="1400" b="1" i="0" dirty="0">
+                <a:solidFill>
+                  <a:srgbClr val="333333"/>
+                </a:solidFill>
+                <a:effectLst/>
+                <a:latin typeface="pingfang SC" panose="020B0400000000000000" charset="-122"/>
+              </a:rPr>
+              <a:t>通知</a:t>
+            </a:r>
+            <a:r>
+              <a:rPr lang="zh-CN" altLang="en-US" sz="1400" b="0" i="0" dirty="0">
+                <a:solidFill>
+                  <a:srgbClr val="333333"/>
+                </a:solidFill>
+                <a:effectLst/>
+                <a:latin typeface="pingfang SC" panose="020B0400000000000000" charset="-122"/>
+              </a:rPr>
+              <a:t>：在观察者模式中，被观察者知道如何通知观察者；在发布</a:t>
+            </a:r>
+            <a:r>
+              <a:rPr lang="en-US" altLang="zh-CN" sz="1400" b="0" i="0" dirty="0">
+                <a:solidFill>
+                  <a:srgbClr val="333333"/>
+                </a:solidFill>
+                <a:effectLst/>
+                <a:latin typeface="pingfang SC" panose="020B0400000000000000" charset="-122"/>
+              </a:rPr>
+              <a:t>/</a:t>
+            </a:r>
+            <a:r>
+              <a:rPr lang="zh-CN" altLang="en-US" sz="1400" b="0" i="0" dirty="0">
+                <a:solidFill>
+                  <a:srgbClr val="333333"/>
+                </a:solidFill>
+                <a:effectLst/>
+                <a:latin typeface="pingfang SC" panose="020B0400000000000000" charset="-122"/>
+              </a:rPr>
+              <a:t>订阅模式中，</a:t>
+            </a:r>
+            <a:r>
+              <a:rPr lang="en-US" altLang="zh-CN" sz="1400" b="0" i="0" dirty="0">
+                <a:solidFill>
+                  <a:srgbClr val="333333"/>
+                </a:solidFill>
+                <a:effectLst/>
+                <a:latin typeface="pingfang SC" panose="020B0400000000000000" charset="-122"/>
+              </a:rPr>
               <a:t> </a:t>
             </a:r>
-            <a:endParaRPr lang="en-US" altLang="zh-CN" dirty="0"/>
-          </a:p>
-          <a:p>
-            <a:r>
-              <a:rPr lang="zh-CN" altLang="en-US" b="1" dirty="0"/>
-              <a:t>缺点：</a:t>
-            </a:r>
-            <a:endParaRPr lang="en-US" altLang="zh-CN" b="1" dirty="0"/>
-          </a:p>
-          <a:p>
-            <a:pPr marL="342900" indent="-342900">
-              <a:buFont typeface="+mj-lt"/>
-              <a:buAutoNum type="arabicPeriod"/>
-            </a:pPr>
-            <a:r>
-              <a:rPr lang="zh-CN" altLang="en-US" sz="1400" dirty="0"/>
-              <a:t>发布、订阅者中间通过</a:t>
-            </a:r>
-            <a:r>
-              <a:rPr lang="en-US" altLang="zh-CN" sz="1400" dirty="0"/>
-              <a:t>channel</a:t>
-            </a:r>
-            <a:r>
-              <a:rPr lang="zh-CN" altLang="en-US" sz="1400" dirty="0"/>
-              <a:t>连接，</a:t>
-            </a:r>
-            <a:endParaRPr lang="en-US" altLang="zh-CN" sz="1400" dirty="0"/>
-          </a:p>
-          <a:p>
-            <a:r>
-              <a:rPr lang="en-US" altLang="zh-CN" sz="1400" dirty="0"/>
-              <a:t>       </a:t>
-            </a:r>
-            <a:r>
-              <a:rPr lang="zh-CN" altLang="en-US" sz="1400" dirty="0"/>
-              <a:t>增加系统复杂度。</a:t>
-            </a:r>
-            <a:endParaRPr lang="en-US" altLang="zh-CN" sz="1400" dirty="0"/>
-          </a:p>
-          <a:p>
-            <a:r>
-              <a:rPr lang="en-US" altLang="zh-CN" sz="1400" dirty="0"/>
-              <a:t>2.   </a:t>
-            </a:r>
-            <a:r>
-              <a:rPr lang="zh-CN" altLang="en-US" sz="1400" dirty="0"/>
-              <a:t>发布者无法得知订阅者是否接收到消息。</a:t>
-            </a:r>
-          </a:p>
-        </p:txBody>
-      </p:sp>
+            <a:r>
+              <a:rPr lang="zh-CN" altLang="en-US" sz="1400" b="0" i="0" dirty="0">
+                <a:solidFill>
+                  <a:srgbClr val="333333"/>
+                </a:solidFill>
+                <a:effectLst/>
+                <a:latin typeface="pingfang SC" panose="020B0400000000000000" charset="-122"/>
+              </a:rPr>
+              <a:t>发布者</a:t>
+            </a:r>
+            <a:r>
+              <a:rPr lang="zh-CN" altLang="en-US" sz="1400" dirty="0">
+                <a:solidFill>
+                  <a:srgbClr val="333333"/>
+                </a:solidFill>
+                <a:latin typeface="pingfang SC" panose="020B0400000000000000" charset="-122"/>
+              </a:rPr>
+              <a:t>对</a:t>
+            </a:r>
+            <a:r>
+              <a:rPr lang="zh-CN" altLang="en-US" sz="1400" b="0" i="0" dirty="0">
+                <a:solidFill>
+                  <a:srgbClr val="333333"/>
+                </a:solidFill>
+                <a:effectLst/>
+                <a:latin typeface="pingfang SC" panose="020B0400000000000000" charset="-122"/>
+              </a:rPr>
+              <a:t>订阅者</a:t>
+            </a:r>
+            <a:endParaRPr lang="en-US" altLang="zh-CN" sz="1400" b="0" i="0" dirty="0">
+              <a:solidFill>
+                <a:srgbClr val="333333"/>
+              </a:solidFill>
+              <a:effectLst/>
+              <a:latin typeface="pingfang SC" panose="020B0400000000000000" charset="-122"/>
+            </a:endParaRPr>
+          </a:p>
+          <a:p>
+            <a:r>
+              <a:rPr lang="en-US" altLang="zh-CN" sz="1400" dirty="0">
+                <a:solidFill>
+                  <a:srgbClr val="333333"/>
+                </a:solidFill>
+                <a:latin typeface="pingfang SC" panose="020B0400000000000000" charset="-122"/>
+              </a:rPr>
+              <a:t>             </a:t>
+            </a:r>
+            <a:r>
+              <a:rPr lang="zh-CN" altLang="en-US" sz="1400" b="0" i="0" dirty="0">
+                <a:solidFill>
+                  <a:srgbClr val="333333"/>
+                </a:solidFill>
+                <a:effectLst/>
+                <a:latin typeface="pingfang SC" panose="020B0400000000000000" charset="-122"/>
+              </a:rPr>
+              <a:t>一无所知，它们只需在消息代理的帮助下进行通信。</a:t>
+            </a:r>
+            <a:endParaRPr lang="en-US" altLang="zh-CN" sz="1400" b="0" i="0" dirty="0">
+              <a:solidFill>
+                <a:srgbClr val="333333"/>
+              </a:solidFill>
+              <a:effectLst/>
+              <a:latin typeface="pingfang SC" panose="020B0400000000000000" charset="-122"/>
+            </a:endParaRPr>
+          </a:p>
+          <a:p>
+            <a:r>
+              <a:rPr lang="en-US" altLang="zh-CN" sz="1400" dirty="0">
+                <a:solidFill>
+                  <a:srgbClr val="333333"/>
+                </a:solidFill>
+                <a:latin typeface="pingfang SC" panose="020B0400000000000000" charset="-122"/>
+              </a:rPr>
+              <a:t>3. </a:t>
+            </a:r>
+            <a:r>
+              <a:rPr lang="zh-CN" altLang="en-US" sz="1400" b="1" dirty="0">
+                <a:solidFill>
+                  <a:srgbClr val="333333"/>
+                </a:solidFill>
+                <a:latin typeface="pingfang SC" panose="020B0400000000000000" charset="-122"/>
+              </a:rPr>
+              <a:t>异步</a:t>
+            </a:r>
+            <a:r>
+              <a:rPr lang="zh-CN" altLang="en-US" sz="1400" dirty="0">
+                <a:solidFill>
+                  <a:srgbClr val="333333"/>
+                </a:solidFill>
+                <a:latin typeface="pingfang SC" panose="020B0400000000000000" charset="-122"/>
+              </a:rPr>
+              <a:t>：</a:t>
+            </a:r>
+            <a:r>
+              <a:rPr lang="zh-CN" altLang="en-US" sz="1400" b="0" i="0" dirty="0">
+                <a:solidFill>
+                  <a:srgbClr val="333333"/>
+                </a:solidFill>
+                <a:effectLst/>
+                <a:latin typeface="pingfang SC" panose="020B0400000000000000" charset="-122"/>
+              </a:rPr>
+              <a:t>观察者模式主要是以同步方式发布消息</a:t>
+            </a:r>
+            <a:r>
+              <a:rPr lang="zh-CN" altLang="en-US" sz="1400" dirty="0">
+                <a:solidFill>
+                  <a:srgbClr val="333333"/>
+                </a:solidFill>
+                <a:latin typeface="pingfang SC" panose="020B0400000000000000" charset="-122"/>
+              </a:rPr>
+              <a:t>；</a:t>
+            </a:r>
+            <a:r>
+              <a:rPr lang="zh-CN" altLang="en-US" sz="1400" b="0" i="0" dirty="0">
+                <a:solidFill>
+                  <a:srgbClr val="333333"/>
+                </a:solidFill>
+                <a:effectLst/>
+                <a:latin typeface="pingfang SC" panose="020B0400000000000000" charset="-122"/>
+              </a:rPr>
+              <a:t>订阅模式通过消息代理实现异步发布消息。</a:t>
+            </a:r>
+            <a:endParaRPr lang="zh-CN" altLang="en-US" sz="1400" b="0" i="0" dirty="0">
+              <a:solidFill>
+                <a:srgbClr val="333333"/>
+              </a:solidFill>
+              <a:effectLst/>
+              <a:latin typeface="pingfang SC" panose="020B0400000000000000" charset="-122"/>
+            </a:endParaRPr>
+          </a:p>
+          <a:p>
+            <a:r>
+              <a:rPr lang="en-US" altLang="zh-CN" sz="1400" b="0" i="0" dirty="0">
+                <a:solidFill>
+                  <a:srgbClr val="333333"/>
+                </a:solidFill>
+                <a:effectLst/>
+                <a:latin typeface="pingfang SC" panose="020B0400000000000000" charset="-122"/>
+              </a:rPr>
+              <a:t>4. </a:t>
+            </a:r>
+            <a:r>
+              <a:rPr lang="zh-CN" altLang="en-US" sz="1400" b="1" i="0" dirty="0">
+                <a:solidFill>
+                  <a:srgbClr val="333333"/>
+                </a:solidFill>
+                <a:effectLst/>
+                <a:latin typeface="pingfang SC" panose="020B0400000000000000" charset="-122"/>
+              </a:rPr>
+              <a:t>关系</a:t>
+            </a:r>
+            <a:r>
+              <a:rPr lang="zh-CN" altLang="en-US" sz="1400" b="0" i="0" dirty="0">
+                <a:solidFill>
+                  <a:srgbClr val="333333"/>
+                </a:solidFill>
+                <a:effectLst/>
+                <a:latin typeface="pingfang SC" panose="020B0400000000000000" charset="-122"/>
+              </a:rPr>
+              <a:t>：观察者中，往往是一对多的关系，而订阅模式中，是多对多的关系。</a:t>
+            </a:r>
+            <a:endParaRPr lang="en-US" altLang="zh-CN" sz="1400" b="0" i="0" dirty="0">
+              <a:solidFill>
+                <a:srgbClr val="333333"/>
+              </a:solidFill>
+              <a:effectLst/>
+              <a:latin typeface="pingfang SC" panose="020B0400000000000000" charset="-122"/>
+            </a:endParaRPr>
+          </a:p>
+          <a:p>
+            <a:endParaRPr lang="zh-CN" altLang="en-US" sz="1400" b="0" i="0" dirty="0">
+              <a:solidFill>
+                <a:srgbClr val="333333"/>
+              </a:solidFill>
+              <a:effectLst/>
+              <a:latin typeface="pingfang SC" panose="020B0400000000000000" charset="-122"/>
+            </a:endParaRPr>
+          </a:p>
+          <a:p>
+            <a:endParaRPr lang="zh-CN" altLang="en-US" sz="1400" dirty="0"/>
+          </a:p>
+        </p:txBody>
+      </p:sp>
+      <p:pic>
+        <p:nvPicPr>
+          <p:cNvPr id="9" name="图片 8"/>
+          <p:cNvPicPr>
+            <a:picLocks noChangeAspect="1"/>
+          </p:cNvPicPr>
+          <p:nvPr/>
+        </p:nvPicPr>
+        <p:blipFill>
+          <a:blip r:embed="rId3">
+            <a:extLst>
+              <a:ext uri="{28A0092B-C50C-407E-A947-70E740481C1C}">
+                <a14:useLocalDpi xmlns:a14="http://schemas.microsoft.com/office/drawing/2010/main" val="0"/>
+              </a:ext>
+            </a:extLst>
+          </a:blip>
+          <a:stretch>
+            <a:fillRect/>
+          </a:stretch>
+        </p:blipFill>
+        <p:spPr>
+          <a:xfrm>
+            <a:off x="5814060" y="2648585"/>
+            <a:ext cx="2823210" cy="2239010"/>
+          </a:xfrm>
+          <a:prstGeom prst="rect">
+            <a:avLst/>
+          </a:prstGeom>
+        </p:spPr>
+      </p:pic>
     </p:spTree>
-    <p:extLst>
-      <p:ext uri="{BB962C8B-B14F-4D97-AF65-F5344CB8AC3E}">
-        <p14:creationId xmlns:p14="http://schemas.microsoft.com/office/powerpoint/2010/main" val="1328623832"/>
-      </p:ext>
-    </p:extLst>
   </p:cSld>
   <p:clrMapOvr>
     <a:masterClrMapping/>
@@ -6333,6 +6310,342 @@
 </file>
 
 <file path=ppt/slides/slide14.xml><?xml version="1.0" encoding="utf-8"?>
+<p:sld xmlns:a="http://schemas.openxmlformats.org/drawingml/2006/main" xmlns:r="http://schemas.openxmlformats.org/officeDocument/2006/relationships" xmlns:p="http://schemas.openxmlformats.org/presentationml/2006/main">
+  <p:cSld>
+    <p:spTree>
+      <p:nvGrpSpPr>
+        <p:cNvPr id="1" name=""/>
+        <p:cNvGrpSpPr/>
+        <p:nvPr/>
+      </p:nvGrpSpPr>
+      <p:grpSpPr>
+        <a:xfrm>
+          <a:off x="0" y="0"/>
+          <a:ext cx="0" cy="0"/>
+          <a:chOff x="0" y="0"/>
+          <a:chExt cx="0" cy="0"/>
+        </a:xfrm>
+      </p:grpSpPr>
+      <p:sp>
+        <p:nvSpPr>
+          <p:cNvPr id="8" name="TextBox 7"/>
+          <p:cNvSpPr txBox="1"/>
+          <p:nvPr/>
+        </p:nvSpPr>
+        <p:spPr>
+          <a:xfrm>
+            <a:off x="345396" y="378616"/>
+            <a:ext cx="3002468" cy="398780"/>
+          </a:xfrm>
+          <a:prstGeom prst="rect">
+            <a:avLst/>
+          </a:prstGeom>
+          <a:noFill/>
+        </p:spPr>
+        <p:txBody>
+          <a:bodyPr wrap="square" rtlCol="0">
+            <a:spAutoFit/>
+          </a:bodyPr>
+          <a:lstStyle/>
+          <a:p>
+            <a:r>
+              <a:rPr lang="zh-CN" altLang="en-US" sz="2000" b="1" dirty="0">
+                <a:solidFill>
+                  <a:srgbClr val="717171"/>
+                </a:solidFill>
+                <a:latin typeface="微软雅黑" panose="020B0503020204020204" pitchFamily="34" charset="-122"/>
+                <a:ea typeface="微软雅黑" panose="020B0503020204020204" pitchFamily="34" charset="-122"/>
+              </a:rPr>
+              <a:t>订阅模式—优缺点</a:t>
+            </a:r>
+            <a:endParaRPr lang="zh-CN" altLang="en-US" sz="2000" b="1" dirty="0">
+              <a:solidFill>
+                <a:srgbClr val="717171"/>
+              </a:solidFill>
+              <a:latin typeface="微软雅黑" panose="020B0503020204020204" pitchFamily="34" charset="-122"/>
+              <a:ea typeface="微软雅黑" panose="020B0503020204020204" pitchFamily="34" charset="-122"/>
+            </a:endParaRPr>
+          </a:p>
+        </p:txBody>
+      </p:sp>
+      <p:pic>
+        <p:nvPicPr>
+          <p:cNvPr id="6" name="Picture 3" descr="C:\Users\yyyy\Desktop\辅助1.jpg"/>
+          <p:cNvPicPr>
+            <a:picLocks noChangeArrowheads="1"/>
+          </p:cNvPicPr>
+          <p:nvPr/>
+        </p:nvPicPr>
+        <p:blipFill rotWithShape="1">
+          <a:blip r:embed="rId1" cstate="print">
+            <a:extLst>
+              <a:ext uri="{28A0092B-C50C-407E-A947-70E740481C1C}">
+                <a14:useLocalDpi xmlns:a14="http://schemas.microsoft.com/office/drawing/2010/main" val="0"/>
+              </a:ext>
+            </a:extLst>
+          </a:blip>
+          <a:srcRect t="67499"/>
+          <a:stretch>
+            <a:fillRect/>
+          </a:stretch>
+        </p:blipFill>
+        <p:spPr bwMode="auto">
+          <a:xfrm>
+            <a:off x="428936" y="793065"/>
+            <a:ext cx="8280000" cy="18000"/>
+          </a:xfrm>
+          <a:prstGeom prst="rect">
+            <a:avLst/>
+          </a:prstGeom>
+          <a:noFill/>
+          <a:extLst>
+            <a:ext uri="{909E8E84-426E-40DD-AFC4-6F175D3DCCD1}">
+              <a14:hiddenFill xmlns:a14="http://schemas.microsoft.com/office/drawing/2010/main">
+                <a:solidFill>
+                  <a:srgbClr val="FFFFFF"/>
+                </a:solidFill>
+              </a14:hiddenFill>
+            </a:ext>
+          </a:extLst>
+        </p:spPr>
+      </p:pic>
+      <p:pic>
+        <p:nvPicPr>
+          <p:cNvPr id="7" name="Picture 2" descr="C:\Users\User\Desktop\胸牌源文件-03.png"/>
+          <p:cNvPicPr>
+            <a:picLocks noChangeAspect="1" noChangeArrowheads="1"/>
+          </p:cNvPicPr>
+          <p:nvPr/>
+        </p:nvPicPr>
+        <p:blipFill>
+          <a:blip r:embed="rId2" cstate="print">
+            <a:extLst>
+              <a:ext uri="{28A0092B-C50C-407E-A947-70E740481C1C}">
+                <a14:useLocalDpi xmlns:a14="http://schemas.microsoft.com/office/drawing/2010/main" val="0"/>
+              </a:ext>
+            </a:extLst>
+          </a:blip>
+          <a:srcRect/>
+          <a:stretch>
+            <a:fillRect/>
+          </a:stretch>
+        </p:blipFill>
+        <p:spPr bwMode="auto">
+          <a:xfrm>
+            <a:off x="7884368" y="307596"/>
+            <a:ext cx="879762" cy="503469"/>
+          </a:xfrm>
+          <a:prstGeom prst="rect">
+            <a:avLst/>
+          </a:prstGeom>
+          <a:noFill/>
+          <a:extLst>
+            <a:ext uri="{909E8E84-426E-40DD-AFC4-6F175D3DCCD1}">
+              <a14:hiddenFill xmlns:a14="http://schemas.microsoft.com/office/drawing/2010/main">
+                <a:solidFill>
+                  <a:srgbClr val="FFFFFF"/>
+                </a:solidFill>
+              </a14:hiddenFill>
+            </a:ext>
+          </a:extLst>
+        </p:spPr>
+      </p:pic>
+      <p:sp>
+        <p:nvSpPr>
+          <p:cNvPr id="3" name="AutoShape 2"/>
+          <p:cNvSpPr>
+            <a:spLocks noChangeAspect="1" noChangeArrowheads="1"/>
+          </p:cNvSpPr>
+          <p:nvPr/>
+        </p:nvSpPr>
+        <p:spPr bwMode="auto">
+          <a:xfrm>
+            <a:off x="4419600" y="2419350"/>
+            <a:ext cx="304800" cy="304800"/>
+          </a:xfrm>
+          <a:prstGeom prst="rect">
+            <a:avLst/>
+          </a:prstGeom>
+          <a:noFill/>
+          <a:extLst>
+            <a:ext uri="{909E8E84-426E-40DD-AFC4-6F175D3DCCD1}">
+              <a14:hiddenFill xmlns:a14="http://schemas.microsoft.com/office/drawing/2010/main">
+                <a:solidFill>
+                  <a:srgbClr val="FFFFFF"/>
+                </a:solidFill>
+              </a14:hiddenFill>
+            </a:ext>
+          </a:extLst>
+        </p:spPr>
+        <p:txBody>
+          <a:bodyPr vert="horz" wrap="square" lIns="91440" tIns="45720" rIns="91440" bIns="45720" numCol="1" anchor="t" anchorCtr="0" compatLnSpc="1"/>
+          <a:lstStyle/>
+          <a:p>
+            <a:endParaRPr lang="zh-CN" altLang="en-US"/>
+          </a:p>
+        </p:txBody>
+      </p:sp>
+      <p:sp>
+        <p:nvSpPr>
+          <p:cNvPr id="4" name="AutoShape 4"/>
+          <p:cNvSpPr>
+            <a:spLocks noChangeAspect="1" noChangeArrowheads="1"/>
+          </p:cNvSpPr>
+          <p:nvPr/>
+        </p:nvSpPr>
+        <p:spPr bwMode="auto">
+          <a:xfrm>
+            <a:off x="4572000" y="2571750"/>
+            <a:ext cx="304800" cy="304800"/>
+          </a:xfrm>
+          <a:prstGeom prst="rect">
+            <a:avLst/>
+          </a:prstGeom>
+          <a:noFill/>
+          <a:extLst>
+            <a:ext uri="{909E8E84-426E-40DD-AFC4-6F175D3DCCD1}">
+              <a14:hiddenFill xmlns:a14="http://schemas.microsoft.com/office/drawing/2010/main">
+                <a:solidFill>
+                  <a:srgbClr val="FFFFFF"/>
+                </a:solidFill>
+              </a14:hiddenFill>
+            </a:ext>
+          </a:extLst>
+        </p:spPr>
+        <p:txBody>
+          <a:bodyPr vert="horz" wrap="square" lIns="91440" tIns="45720" rIns="91440" bIns="45720" numCol="1" anchor="t" anchorCtr="0" compatLnSpc="1"/>
+          <a:lstStyle/>
+          <a:p>
+            <a:endParaRPr lang="zh-CN" altLang="en-US"/>
+          </a:p>
+        </p:txBody>
+      </p:sp>
+      <p:sp>
+        <p:nvSpPr>
+          <p:cNvPr id="2" name="文本框 1"/>
+          <p:cNvSpPr txBox="1"/>
+          <p:nvPr/>
+        </p:nvSpPr>
+        <p:spPr>
+          <a:xfrm>
+            <a:off x="349740" y="1122224"/>
+            <a:ext cx="6455613" cy="2000548"/>
+          </a:xfrm>
+          <a:prstGeom prst="rect">
+            <a:avLst/>
+          </a:prstGeom>
+          <a:noFill/>
+        </p:spPr>
+        <p:txBody>
+          <a:bodyPr wrap="none" rtlCol="0">
+            <a:spAutoFit/>
+          </a:bodyPr>
+          <a:lstStyle/>
+          <a:p>
+            <a:r>
+              <a:rPr lang="zh-CN" altLang="en-US" b="1" dirty="0"/>
+              <a:t>优点：</a:t>
+            </a:r>
+            <a:endParaRPr lang="en-US" altLang="zh-CN" b="1" dirty="0"/>
+          </a:p>
+          <a:p>
+            <a:pPr marL="342900" indent="-342900">
+              <a:buFont typeface="+mj-lt"/>
+              <a:buAutoNum type="arabicPeriod"/>
+            </a:pPr>
+            <a:r>
+              <a:rPr lang="zh-CN" altLang="en-US" sz="1400" dirty="0"/>
+              <a:t>实现松耦合，使得发布、订阅者之间彻底分开，他们</a:t>
+            </a:r>
+            <a:r>
+              <a:rPr lang="zh-CN" altLang="en-US" sz="1400" b="0" i="0" dirty="0">
+                <a:solidFill>
+                  <a:srgbClr val="333333"/>
+                </a:solidFill>
+                <a:effectLst/>
+                <a:latin typeface="pingfang SC" panose="020B0400000000000000" charset="-122"/>
+              </a:rPr>
+              <a:t>只需要遵守一份协议。</a:t>
+            </a:r>
+            <a:endParaRPr lang="en-US" altLang="zh-CN" sz="1400" dirty="0"/>
+          </a:p>
+          <a:p>
+            <a:pPr marL="342900" indent="-342900">
+              <a:buFont typeface="+mj-lt"/>
+              <a:buAutoNum type="arabicPeriod"/>
+            </a:pPr>
+            <a:r>
+              <a:rPr lang="zh-CN" altLang="en-US" sz="1400" dirty="0"/>
+              <a:t>异步消息不再阻塞发布进程。</a:t>
+            </a:r>
+            <a:endParaRPr lang="en-US" altLang="zh-CN" sz="1400" dirty="0"/>
+          </a:p>
+          <a:p>
+            <a:r>
+              <a:rPr lang="zh-CN" altLang="en-US" dirty="0"/>
+              <a:t> </a:t>
+            </a:r>
+            <a:endParaRPr lang="en-US" altLang="zh-CN" dirty="0"/>
+          </a:p>
+          <a:p>
+            <a:r>
+              <a:rPr lang="zh-CN" altLang="en-US" b="1" dirty="0"/>
+              <a:t>缺点：</a:t>
+            </a:r>
+            <a:endParaRPr lang="en-US" altLang="zh-CN" b="1" dirty="0"/>
+          </a:p>
+          <a:p>
+            <a:pPr marL="342900" indent="-342900">
+              <a:buFont typeface="+mj-lt"/>
+              <a:buAutoNum type="arabicPeriod"/>
+            </a:pPr>
+            <a:r>
+              <a:rPr lang="zh-CN" altLang="en-US" sz="1400" dirty="0"/>
+              <a:t>发布、订阅者中间通过</a:t>
+            </a:r>
+            <a:r>
+              <a:rPr lang="en-US" altLang="zh-CN" sz="1400" dirty="0"/>
+              <a:t>channel</a:t>
+            </a:r>
+            <a:r>
+              <a:rPr lang="zh-CN" altLang="en-US" sz="1400" dirty="0"/>
+              <a:t>连接，</a:t>
+            </a:r>
+            <a:endParaRPr lang="en-US" altLang="zh-CN" sz="1400" dirty="0"/>
+          </a:p>
+          <a:p>
+            <a:r>
+              <a:rPr lang="en-US" altLang="zh-CN" sz="1400" dirty="0"/>
+              <a:t>       </a:t>
+            </a:r>
+            <a:r>
+              <a:rPr lang="zh-CN" altLang="en-US" sz="1400" dirty="0"/>
+              <a:t>增加系统复杂度。</a:t>
+            </a:r>
+            <a:endParaRPr lang="en-US" altLang="zh-CN" sz="1400" dirty="0"/>
+          </a:p>
+          <a:p>
+            <a:r>
+              <a:rPr lang="en-US" altLang="zh-CN" sz="1400" dirty="0"/>
+              <a:t>2.   </a:t>
+            </a:r>
+            <a:r>
+              <a:rPr lang="zh-CN" altLang="en-US" sz="1400" dirty="0"/>
+              <a:t>发布者无法得知订阅者是否接收到消息。</a:t>
+            </a:r>
+            <a:endParaRPr lang="zh-CN" altLang="en-US" sz="1400" dirty="0"/>
+          </a:p>
+        </p:txBody>
+      </p:sp>
+    </p:spTree>
+  </p:cSld>
+  <p:clrMapOvr>
+    <a:masterClrMapping/>
+  </p:clrMapOvr>
+</p:sld>
+</file>
+
+<file path=ppt/slides/slide15.xml><?xml version="1.0" encoding="utf-8"?>
 <p:sld xmlns:a="http://schemas.openxmlformats.org/drawingml/2006/main" xmlns:r="http://schemas.openxmlformats.org/officeDocument/2006/relationships" xmlns:p="http://schemas.openxmlformats.org/presentationml/2006/main">
   <p:cSld>
     <p:spTree>
@@ -6358,7 +6671,7 @@
           <p:nvPr/>
         </p:nvPicPr>
         <p:blipFill rotWithShape="1">
-          <a:blip r:embed="rId2" cstate="print">
+          <a:blip r:embed="rId1" cstate="print">
             <a:extLst>
               <a:ext uri="{28A0092B-C50C-407E-A947-70E740481C1C}">
                 <a14:useLocalDpi xmlns:a14="http://schemas.microsoft.com/office/drawing/2010/main" val="0"/>
@@ -6558,7 +6871,7 @@
           <p:nvPr/>
         </p:nvPicPr>
         <p:blipFill>
-          <a:blip r:embed="rId3" cstate="print">
+          <a:blip r:embed="rId2" cstate="print">
             <a:extLst>
               <a:ext uri="{28A0092B-C50C-407E-A947-70E740481C1C}">
                 <a14:useLocalDpi xmlns:a14="http://schemas.microsoft.com/office/drawing/2010/main" val="0"/>
@@ -6647,6 +6960,13 @@
               </a:rPr>
               <a:t>例子</a:t>
             </a:r>
+            <a:endParaRPr lang="zh-CN" altLang="en-US" sz="2000" b="1" dirty="0">
+              <a:solidFill>
+                <a:srgbClr val="717171"/>
+              </a:solidFill>
+              <a:latin typeface="微软雅黑" panose="020B0503020204020204" pitchFamily="34" charset="-122"/>
+              <a:ea typeface="微软雅黑" panose="020B0503020204020204" pitchFamily="34" charset="-122"/>
+            </a:endParaRPr>
           </a:p>
         </p:txBody>
       </p:sp>
@@ -6659,7 +6979,7 @@
           <p:nvPr/>
         </p:nvPicPr>
         <p:blipFill rotWithShape="1">
-          <a:blip r:embed="rId3" cstate="print">
+          <a:blip r:embed="rId1" cstate="print">
             <a:extLst>
               <a:ext uri="{28A0092B-C50C-407E-A947-70E740481C1C}">
                 <a14:useLocalDpi xmlns:a14="http://schemas.microsoft.com/office/drawing/2010/main" val="0"/>
@@ -6700,7 +7020,7 @@
           <p:nvPr/>
         </p:nvPicPr>
         <p:blipFill>
-          <a:blip r:embed="rId4" cstate="print">
+          <a:blip r:embed="rId2" cstate="print">
             <a:extLst>
               <a:ext uri="{28A0092B-C50C-407E-A947-70E740481C1C}">
                 <a14:useLocalDpi xmlns:a14="http://schemas.microsoft.com/office/drawing/2010/main" val="0"/>
@@ -6734,13 +7054,7 @@
       </p:pic>
       <p:sp>
         <p:nvSpPr>
-          <p:cNvPr id="16" name="文本框 15">
-            <a:extLst>
-              <a:ext uri="{FF2B5EF4-FFF2-40B4-BE49-F238E27FC236}">
-                <a16:creationId xmlns:a16="http://schemas.microsoft.com/office/drawing/2014/main" id="{C945B4C4-416E-4006-8D0E-B465BEAC4CB2}"/>
-              </a:ext>
-            </a:extLst>
-          </p:cNvPr>
+          <p:cNvPr id="16" name="文本框 15"/>
           <p:cNvSpPr txBox="1"/>
           <p:nvPr/>
         </p:nvSpPr>
@@ -6850,20 +7164,14 @@
       </p:sp>
       <p:pic>
         <p:nvPicPr>
-          <p:cNvPr id="18" name="图片 17">
-            <a:extLst>
-              <a:ext uri="{FF2B5EF4-FFF2-40B4-BE49-F238E27FC236}">
-                <a16:creationId xmlns:a16="http://schemas.microsoft.com/office/drawing/2014/main" id="{28F3C489-BA14-49D2-865D-5DCF8B41B4AD}"/>
-              </a:ext>
-            </a:extLst>
-          </p:cNvPr>
+          <p:cNvPr id="18" name="图片 17"/>
           <p:cNvPicPr>
             <a:picLocks noChangeAspect="1"/>
           </p:cNvPicPr>
           <p:nvPr/>
         </p:nvPicPr>
         <p:blipFill>
-          <a:blip r:embed="rId5"/>
+          <a:blip r:embed="rId3"/>
           <a:stretch>
             <a:fillRect/>
           </a:stretch>
@@ -6935,6 +7243,13 @@
               </a:rPr>
               <a:t>例子</a:t>
             </a:r>
+            <a:endParaRPr lang="zh-CN" altLang="en-US" sz="2000" b="1" dirty="0">
+              <a:solidFill>
+                <a:srgbClr val="717171"/>
+              </a:solidFill>
+              <a:latin typeface="微软雅黑" panose="020B0503020204020204" pitchFamily="34" charset="-122"/>
+              <a:ea typeface="微软雅黑" panose="020B0503020204020204" pitchFamily="34" charset="-122"/>
+            </a:endParaRPr>
           </a:p>
         </p:txBody>
       </p:sp>
@@ -6947,7 +7262,7 @@
           <p:nvPr/>
         </p:nvPicPr>
         <p:blipFill rotWithShape="1">
-          <a:blip r:embed="rId3" cstate="print">
+          <a:blip r:embed="rId1" cstate="print">
             <a:extLst>
               <a:ext uri="{28A0092B-C50C-407E-A947-70E740481C1C}">
                 <a14:useLocalDpi xmlns:a14="http://schemas.microsoft.com/office/drawing/2010/main" val="0"/>
@@ -6988,7 +7303,7 @@
           <p:nvPr/>
         </p:nvPicPr>
         <p:blipFill>
-          <a:blip r:embed="rId4" cstate="print">
+          <a:blip r:embed="rId2" cstate="print">
             <a:extLst>
               <a:ext uri="{28A0092B-C50C-407E-A947-70E740481C1C}">
                 <a14:useLocalDpi xmlns:a14="http://schemas.microsoft.com/office/drawing/2010/main" val="0"/>
@@ -7022,13 +7337,7 @@
       </p:pic>
       <p:sp>
         <p:nvSpPr>
-          <p:cNvPr id="16" name="文本框 15">
-            <a:extLst>
-              <a:ext uri="{FF2B5EF4-FFF2-40B4-BE49-F238E27FC236}">
-                <a16:creationId xmlns:a16="http://schemas.microsoft.com/office/drawing/2014/main" id="{C945B4C4-416E-4006-8D0E-B465BEAC4CB2}"/>
-              </a:ext>
-            </a:extLst>
-          </p:cNvPr>
+          <p:cNvPr id="16" name="文本框 15"/>
           <p:cNvSpPr txBox="1"/>
           <p:nvPr/>
         </p:nvSpPr>
@@ -7213,20 +7522,14 @@
       </p:sp>
       <p:pic>
         <p:nvPicPr>
-          <p:cNvPr id="3" name="图片 2">
-            <a:extLst>
-              <a:ext uri="{FF2B5EF4-FFF2-40B4-BE49-F238E27FC236}">
-                <a16:creationId xmlns:a16="http://schemas.microsoft.com/office/drawing/2014/main" id="{C71CA90F-2004-4736-8114-ED3F1BE9F52E}"/>
-              </a:ext>
-            </a:extLst>
-          </p:cNvPr>
+          <p:cNvPr id="3" name="图片 2"/>
           <p:cNvPicPr>
             <a:picLocks noChangeAspect="1"/>
           </p:cNvPicPr>
           <p:nvPr/>
         </p:nvPicPr>
         <p:blipFill>
-          <a:blip r:embed="rId5"/>
+          <a:blip r:embed="rId3"/>
           <a:stretch>
             <a:fillRect/>
           </a:stretch>
@@ -7242,11 +7545,6 @@
         </p:spPr>
       </p:pic>
     </p:spTree>
-    <p:extLst>
-      <p:ext uri="{BB962C8B-B14F-4D97-AF65-F5344CB8AC3E}">
-        <p14:creationId xmlns:p14="http://schemas.microsoft.com/office/powerpoint/2010/main" val="2832228277"/>
-      </p:ext>
-    </p:extLst>
   </p:cSld>
   <p:clrMapOvr>
     <a:masterClrMapping/>
@@ -7303,6 +7601,13 @@
               </a:rPr>
               <a:t>定义</a:t>
             </a:r>
+            <a:endParaRPr lang="zh-CN" altLang="en-US" sz="2000" b="1" dirty="0">
+              <a:solidFill>
+                <a:srgbClr val="717171"/>
+              </a:solidFill>
+              <a:latin typeface="微软雅黑" panose="020B0503020204020204" pitchFamily="34" charset="-122"/>
+              <a:ea typeface="微软雅黑" panose="020B0503020204020204" pitchFamily="34" charset="-122"/>
+            </a:endParaRPr>
           </a:p>
         </p:txBody>
       </p:sp>
@@ -7315,7 +7620,7 @@
           <p:nvPr/>
         </p:nvPicPr>
         <p:blipFill rotWithShape="1">
-          <a:blip r:embed="rId3" cstate="print">
+          <a:blip r:embed="rId1" cstate="print">
             <a:extLst>
               <a:ext uri="{28A0092B-C50C-407E-A947-70E740481C1C}">
                 <a14:useLocalDpi xmlns:a14="http://schemas.microsoft.com/office/drawing/2010/main" val="0"/>
@@ -7356,7 +7661,7 @@
           <p:nvPr/>
         </p:nvPicPr>
         <p:blipFill>
-          <a:blip r:embed="rId4" cstate="print">
+          <a:blip r:embed="rId2" cstate="print">
             <a:extLst>
               <a:ext uri="{28A0092B-C50C-407E-A947-70E740481C1C}">
                 <a14:useLocalDpi xmlns:a14="http://schemas.microsoft.com/office/drawing/2010/main" val="0"/>
@@ -7426,7 +7731,7 @@
                   <a:srgbClr val="444444"/>
                 </a:solidFill>
                 <a:effectLst/>
-                <a:latin typeface="Helvetica Neue"/>
+                <a:latin typeface="Helvetica Neue" panose="02000503000000020004"/>
               </a:rPr>
               <a:t>指多个对象间存在一对多的依赖关系，</a:t>
             </a:r>
@@ -7436,7 +7741,7 @@
                   <a:srgbClr val="333333"/>
                 </a:solidFill>
                 <a:effectLst/>
-                <a:latin typeface="Helvetica Neue"/>
+                <a:latin typeface="Helvetica Neue" panose="02000503000000020004"/>
               </a:rPr>
               <a:t>当一个对象被修改时，则会自动通知依赖它的对象</a:t>
             </a:r>
@@ -7528,6 +7833,7 @@
               <a:rPr lang="zh-CN" altLang="en-US" dirty="0"/>
               <a:t>     </a:t>
             </a:r>
+            <a:endParaRPr lang="zh-CN" altLang="en-US" dirty="0"/>
           </a:p>
         </p:txBody>
       </p:sp>
@@ -7588,6 +7894,13 @@
               </a:rPr>
               <a:t>角色</a:t>
             </a:r>
+            <a:endParaRPr lang="zh-CN" altLang="en-US" sz="2000" b="1" dirty="0">
+              <a:solidFill>
+                <a:srgbClr val="717171"/>
+              </a:solidFill>
+              <a:latin typeface="微软雅黑" panose="020B0503020204020204" pitchFamily="34" charset="-122"/>
+              <a:ea typeface="微软雅黑" panose="020B0503020204020204" pitchFamily="34" charset="-122"/>
+            </a:endParaRPr>
           </a:p>
         </p:txBody>
       </p:sp>
@@ -7600,7 +7913,7 @@
           <p:nvPr/>
         </p:nvPicPr>
         <p:blipFill rotWithShape="1">
-          <a:blip r:embed="rId3" cstate="print">
+          <a:blip r:embed="rId1" cstate="print">
             <a:extLst>
               <a:ext uri="{28A0092B-C50C-407E-A947-70E740481C1C}">
                 <a14:useLocalDpi xmlns:a14="http://schemas.microsoft.com/office/drawing/2010/main" val="0"/>
@@ -7641,7 +7954,7 @@
           <p:nvPr/>
         </p:nvPicPr>
         <p:blipFill>
-          <a:blip r:embed="rId4" cstate="print">
+          <a:blip r:embed="rId2" cstate="print">
             <a:extLst>
               <a:ext uri="{28A0092B-C50C-407E-A947-70E740481C1C}">
                 <a14:useLocalDpi xmlns:a14="http://schemas.microsoft.com/office/drawing/2010/main" val="0"/>
@@ -7715,6 +8028,13 @@
               </a:rPr>
               <a:t>：提供一个保存抽象观察者对象的集合，增加、删除观察者对象的方法，以及通知所有观察者的抽象方法。</a:t>
             </a:r>
+            <a:endParaRPr lang="zh-CN" altLang="en-US" sz="1400" i="0" dirty="0">
+              <a:solidFill>
+                <a:srgbClr val="444444"/>
+              </a:solidFill>
+              <a:effectLst/>
+              <a:latin typeface="PT Sans" panose="020B0503020203020204" pitchFamily="34" charset="0"/>
+            </a:endParaRPr>
           </a:p>
           <a:p>
             <a:endParaRPr lang="zh-CN" altLang="en-US" sz="1400" b="1" i="0" dirty="0">
@@ -7746,8 +8066,6 @@
               </a:rPr>
               <a:t>：它实现抽象目标中的通知方法，当具体主题的内部状态发生改变时，通知所有注册过的观察者对象。</a:t>
             </a:r>
-          </a:p>
-          <a:p>
             <a:endParaRPr lang="zh-CN" altLang="en-US" sz="1400" i="0" dirty="0">
               <a:solidFill>
                 <a:srgbClr val="444444"/>
@@ -7757,6 +8075,15 @@
             </a:endParaRPr>
           </a:p>
           <a:p>
+            <a:endParaRPr lang="zh-CN" altLang="en-US" sz="1400" i="0" dirty="0">
+              <a:solidFill>
+                <a:srgbClr val="444444"/>
+              </a:solidFill>
+              <a:effectLst/>
+              <a:latin typeface="PT Sans" panose="020B0503020203020204" pitchFamily="34" charset="0"/>
+            </a:endParaRPr>
+          </a:p>
+          <a:p>
             <a:r>
               <a:rPr lang="zh-CN" altLang="en-US" sz="1400" b="1" i="0" dirty="0">
                 <a:solidFill>
@@ -7777,6 +8104,13 @@
               </a:rPr>
               <a:t>：包含了一个更新自己的抽象方法，当接到具体主题的更改通知时被调用。</a:t>
             </a:r>
+            <a:endParaRPr lang="zh-CN" altLang="en-US" sz="1400" b="0" i="0" dirty="0">
+              <a:solidFill>
+                <a:srgbClr val="000000"/>
+              </a:solidFill>
+              <a:effectLst/>
+              <a:latin typeface="PT Sans" panose="020B0503020203020204" pitchFamily="34" charset="0"/>
+            </a:endParaRPr>
           </a:p>
           <a:p>
             <a:endParaRPr lang="en-US" altLang="zh-CN" sz="1400" b="0" i="0" dirty="0">
@@ -7893,6 +8227,13 @@
               </a:rPr>
               <a:t>类图</a:t>
             </a:r>
+            <a:endParaRPr lang="zh-CN" altLang="en-US" sz="2000" b="1" dirty="0">
+              <a:solidFill>
+                <a:srgbClr val="717171"/>
+              </a:solidFill>
+              <a:latin typeface="微软雅黑" panose="020B0503020204020204" pitchFamily="34" charset="-122"/>
+              <a:ea typeface="微软雅黑" panose="020B0503020204020204" pitchFamily="34" charset="-122"/>
+            </a:endParaRPr>
           </a:p>
         </p:txBody>
       </p:sp>
@@ -7905,7 +8246,7 @@
           <p:nvPr/>
         </p:nvPicPr>
         <p:blipFill rotWithShape="1">
-          <a:blip r:embed="rId3" cstate="print">
+          <a:blip r:embed="rId1" cstate="print">
             <a:extLst>
               <a:ext uri="{28A0092B-C50C-407E-A947-70E740481C1C}">
                 <a14:useLocalDpi xmlns:a14="http://schemas.microsoft.com/office/drawing/2010/main" val="0"/>
@@ -7946,7 +8287,7 @@
           <p:nvPr/>
         </p:nvPicPr>
         <p:blipFill>
-          <a:blip r:embed="rId4" cstate="print">
+          <a:blip r:embed="rId2" cstate="print">
             <a:extLst>
               <a:ext uri="{28A0092B-C50C-407E-A947-70E740481C1C}">
                 <a14:useLocalDpi xmlns:a14="http://schemas.microsoft.com/office/drawing/2010/main" val="0"/>
@@ -7987,7 +8328,7 @@
           <p:nvPr/>
         </p:nvPicPr>
         <p:blipFill>
-          <a:blip r:embed="rId5">
+          <a:blip r:embed="rId3">
             <a:extLst>
               <a:ext uri="{28A0092B-C50C-407E-A947-70E740481C1C}">
                 <a14:useLocalDpi xmlns:a14="http://schemas.microsoft.com/office/drawing/2010/main" val="0"/>
@@ -8065,6 +8406,13 @@
               </a:rPr>
               <a:t>例子</a:t>
             </a:r>
+            <a:endParaRPr lang="zh-CN" altLang="en-US" sz="2000" b="1" dirty="0">
+              <a:solidFill>
+                <a:srgbClr val="717171"/>
+              </a:solidFill>
+              <a:latin typeface="微软雅黑" panose="020B0503020204020204" pitchFamily="34" charset="-122"/>
+              <a:ea typeface="微软雅黑" panose="020B0503020204020204" pitchFamily="34" charset="-122"/>
+            </a:endParaRPr>
           </a:p>
         </p:txBody>
       </p:sp>
@@ -8077,7 +8425,7 @@
           <p:nvPr/>
         </p:nvPicPr>
         <p:blipFill rotWithShape="1">
-          <a:blip r:embed="rId3" cstate="print">
+          <a:blip r:embed="rId1" cstate="print">
             <a:extLst>
               <a:ext uri="{28A0092B-C50C-407E-A947-70E740481C1C}">
                 <a14:useLocalDpi xmlns:a14="http://schemas.microsoft.com/office/drawing/2010/main" val="0"/>
@@ -8118,7 +8466,7 @@
           <p:nvPr/>
         </p:nvPicPr>
         <p:blipFill>
-          <a:blip r:embed="rId4" cstate="print">
+          <a:blip r:embed="rId2" cstate="print">
             <a:extLst>
               <a:ext uri="{28A0092B-C50C-407E-A947-70E740481C1C}">
                 <a14:useLocalDpi xmlns:a14="http://schemas.microsoft.com/office/drawing/2010/main" val="0"/>
@@ -8205,14 +8553,14 @@
           <p:nvPr/>
         </p:nvPicPr>
         <p:blipFill>
-          <a:blip r:embed="rId5"/>
+          <a:blip r:embed="rId3"/>
           <a:stretch>
             <a:fillRect/>
           </a:stretch>
         </p:blipFill>
         <p:spPr>
           <a:xfrm>
-            <a:off x="251520" y="2456358"/>
+            <a:off x="251520" y="2472868"/>
             <a:ext cx="4409006" cy="2286948"/>
           </a:xfrm>
           <a:prstGeom prst="rect">
@@ -8229,7 +8577,7 @@
           <p:nvPr/>
         </p:nvPicPr>
         <p:blipFill>
-          <a:blip r:embed="rId6"/>
+          <a:blip r:embed="rId4"/>
           <a:stretch>
             <a:fillRect/>
           </a:stretch>
@@ -8301,6 +8649,13 @@
               </a:rPr>
               <a:t>例子</a:t>
             </a:r>
+            <a:endParaRPr lang="zh-CN" altLang="en-US" sz="2000" b="1" dirty="0">
+              <a:solidFill>
+                <a:srgbClr val="717171"/>
+              </a:solidFill>
+              <a:latin typeface="微软雅黑" panose="020B0503020204020204" pitchFamily="34" charset="-122"/>
+              <a:ea typeface="微软雅黑" panose="020B0503020204020204" pitchFamily="34" charset="-122"/>
+            </a:endParaRPr>
           </a:p>
         </p:txBody>
       </p:sp>
@@ -8313,7 +8668,7 @@
           <p:nvPr/>
         </p:nvPicPr>
         <p:blipFill rotWithShape="1">
-          <a:blip r:embed="rId3" cstate="print">
+          <a:blip r:embed="rId1" cstate="print">
             <a:extLst>
               <a:ext uri="{28A0092B-C50C-407E-A947-70E740481C1C}">
                 <a14:useLocalDpi xmlns:a14="http://schemas.microsoft.com/office/drawing/2010/main" val="0"/>
@@ -8354,7 +8709,7 @@
           <p:nvPr/>
         </p:nvPicPr>
         <p:blipFill>
-          <a:blip r:embed="rId4" cstate="print">
+          <a:blip r:embed="rId2" cstate="print">
             <a:extLst>
               <a:ext uri="{28A0092B-C50C-407E-A947-70E740481C1C}">
                 <a14:useLocalDpi xmlns:a14="http://schemas.microsoft.com/office/drawing/2010/main" val="0"/>
@@ -8395,7 +8750,7 @@
           <p:nvPr/>
         </p:nvPicPr>
         <p:blipFill>
-          <a:blip r:embed="rId5"/>
+          <a:blip r:embed="rId3"/>
           <a:stretch>
             <a:fillRect/>
           </a:stretch>
@@ -8448,6 +8803,7 @@
               <a:rPr lang="zh-CN" altLang="en-US" sz="1400" dirty="0"/>
               <a:t>周期的回调</a:t>
             </a:r>
+            <a:endParaRPr lang="zh-CN" altLang="en-US" sz="1400" dirty="0"/>
           </a:p>
         </p:txBody>
       </p:sp>
@@ -8508,6 +8864,13 @@
               </a:rPr>
               <a:t>小结</a:t>
             </a:r>
+            <a:endParaRPr lang="zh-CN" altLang="en-US" sz="2000" b="1" dirty="0">
+              <a:solidFill>
+                <a:srgbClr val="717171"/>
+              </a:solidFill>
+              <a:latin typeface="微软雅黑" panose="020B0503020204020204" pitchFamily="34" charset="-122"/>
+              <a:ea typeface="微软雅黑" panose="020B0503020204020204" pitchFamily="34" charset="-122"/>
+            </a:endParaRPr>
           </a:p>
         </p:txBody>
       </p:sp>
@@ -8520,7 +8883,7 @@
           <p:nvPr/>
         </p:nvPicPr>
         <p:blipFill rotWithShape="1">
-          <a:blip r:embed="rId3" cstate="print">
+          <a:blip r:embed="rId1" cstate="print">
             <a:extLst>
               <a:ext uri="{28A0092B-C50C-407E-A947-70E740481C1C}">
                 <a14:useLocalDpi xmlns:a14="http://schemas.microsoft.com/office/drawing/2010/main" val="0"/>
@@ -8561,7 +8924,7 @@
           <p:nvPr/>
         </p:nvPicPr>
         <p:blipFill>
-          <a:blip r:embed="rId4" cstate="print">
+          <a:blip r:embed="rId2" cstate="print">
             <a:extLst>
               <a:ext uri="{28A0092B-C50C-407E-A947-70E740481C1C}">
                 <a14:useLocalDpi xmlns:a14="http://schemas.microsoft.com/office/drawing/2010/main" val="0"/>
@@ -8667,7 +9030,7 @@
                   <a:srgbClr val="333333"/>
                 </a:solidFill>
                 <a:effectLst/>
-                <a:latin typeface="Helvetica Neue"/>
+                <a:latin typeface="Helvetica Neue" panose="02000503000000020004"/>
               </a:rPr>
               <a:t>A</a:t>
             </a:r>
@@ -8677,7 +9040,7 @@
                   <a:srgbClr val="333333"/>
                 </a:solidFill>
                 <a:effectLst/>
-                <a:latin typeface="Helvetica Neue"/>
+                <a:latin typeface="Helvetica Neue" panose="02000503000000020004"/>
               </a:rPr>
               <a:t>对象的行为将影响</a:t>
             </a:r>
@@ -8687,7 +9050,7 @@
                   <a:srgbClr val="333333"/>
                 </a:solidFill>
                 <a:effectLst/>
-                <a:latin typeface="Helvetica Neue"/>
+                <a:latin typeface="Helvetica Neue" panose="02000503000000020004"/>
               </a:rPr>
               <a:t>B</a:t>
             </a:r>
@@ -8697,7 +9060,7 @@
                   <a:srgbClr val="333333"/>
                 </a:solidFill>
                 <a:effectLst/>
-                <a:latin typeface="Helvetica Neue"/>
+                <a:latin typeface="Helvetica Neue" panose="02000503000000020004"/>
               </a:rPr>
               <a:t>对象，</a:t>
             </a:r>
@@ -8706,7 +9069,7 @@
                 <a:srgbClr val="333333"/>
               </a:solidFill>
               <a:effectLst/>
-              <a:latin typeface="Helvetica Neue"/>
+              <a:latin typeface="Helvetica Neue" panose="02000503000000020004"/>
             </a:endParaRPr>
           </a:p>
           <a:p>
@@ -8715,7 +9078,7 @@
                 <a:solidFill>
                   <a:srgbClr val="333333"/>
                 </a:solidFill>
-                <a:latin typeface="Helvetica Neue"/>
+                <a:latin typeface="Helvetica Neue" panose="02000503000000020004"/>
               </a:rPr>
               <a:t>      </a:t>
             </a:r>
@@ -8725,7 +9088,7 @@
                   <a:srgbClr val="333333"/>
                 </a:solidFill>
                 <a:effectLst/>
-                <a:latin typeface="Helvetica Neue"/>
+                <a:latin typeface="Helvetica Neue" panose="02000503000000020004"/>
               </a:rPr>
               <a:t>B</a:t>
             </a:r>
@@ -8735,7 +9098,7 @@
                   <a:srgbClr val="333333"/>
                 </a:solidFill>
                 <a:effectLst/>
-                <a:latin typeface="Helvetica Neue"/>
+                <a:latin typeface="Helvetica Neue" panose="02000503000000020004"/>
               </a:rPr>
               <a:t>对象的行为将影响</a:t>
             </a:r>
@@ -8745,7 +9108,7 @@
                   <a:srgbClr val="333333"/>
                 </a:solidFill>
                 <a:effectLst/>
-                <a:latin typeface="Helvetica Neue"/>
+                <a:latin typeface="Helvetica Neue" panose="02000503000000020004"/>
               </a:rPr>
               <a:t>C</a:t>
             </a:r>
@@ -8755,7 +9118,7 @@
                   <a:srgbClr val="333333"/>
                 </a:solidFill>
                 <a:effectLst/>
-                <a:latin typeface="Helvetica Neue"/>
+                <a:latin typeface="Helvetica Neue" panose="02000503000000020004"/>
               </a:rPr>
               <a:t>对象</a:t>
             </a:r>
@@ -8765,7 +9128,7 @@
                   <a:srgbClr val="333333"/>
                 </a:solidFill>
                 <a:effectLst/>
-                <a:latin typeface="Helvetica Neue"/>
+                <a:latin typeface="Helvetica Neue" panose="02000503000000020004"/>
               </a:rPr>
               <a:t>……</a:t>
             </a:r>
@@ -9066,8 +9429,6 @@
       </a:bgFillStyleLst>
     </a:fmtScheme>
   </a:themeElements>
-  <a:objectDefaults/>
-  <a:extraClrSchemeLst/>
   <a:extLst>
     <a:ext uri="{05A4C25C-085E-4340-85A3-A5531E510DB2}">
       <thm15:themeFamily xmlns:thm15="http://schemas.microsoft.com/office/thememl/2012/main" name="Office Theme" id="{62F939B6-93AF-4DB8-9C6B-D6C7DFDC589F}" vid="{4A3C46E8-61CC-4603-A589-7422A47A8E4A}"/>
@@ -9327,8 +9688,6 @@
       </a:bgFillStyleLst>
     </a:fmtScheme>
   </a:themeElements>
-  <a:objectDefaults/>
-  <a:extraClrSchemeLst/>
   <a:extLst>
     <a:ext uri="{05A4C25C-085E-4340-85A3-A5531E510DB2}">
       <thm15:themeFamily xmlns:thm15="http://schemas.microsoft.com/office/thememl/2012/main" name="Office Theme" id="{62F939B6-93AF-4DB8-9C6B-D6C7DFDC589F}" vid="{4A3C46E8-61CC-4603-A589-7422A47A8E4A}"/>

</xml_diff>

<commit_message>
[feature] update subscriber demo
</commit_message>
<xml_diff>
--- a/ObservableMode/观查者模式.pptx
+++ b/ObservableMode/观查者模式.pptx
@@ -19,8 +19,8 @@
     <p:sldId id="346" r:id="rId12"/>
     <p:sldId id="355" r:id="rId13"/>
     <p:sldId id="348" r:id="rId14"/>
-    <p:sldId id="369" r:id="rId15"/>
-    <p:sldId id="358" r:id="rId16"/>
+    <p:sldId id="358" r:id="rId15"/>
+    <p:sldId id="369" r:id="rId16"/>
     <p:sldId id="357" r:id="rId17"/>
     <p:sldId id="345" r:id="rId18"/>
   </p:sldIdLst>
@@ -4576,7 +4576,7 @@
         <p:spPr>
           <a:xfrm>
             <a:off x="1024687" y="2762375"/>
-            <a:ext cx="1512168" cy="613694"/>
+            <a:ext cx="1512168" cy="645160"/>
           </a:xfrm>
           <a:prstGeom prst="rect">
             <a:avLst/>
@@ -4637,7 +4637,7 @@
                 <a:latin typeface="微软雅黑" panose="020B0503020204020204" pitchFamily="34" charset="-122"/>
                 <a:ea typeface="微软雅黑" panose="020B0503020204020204" pitchFamily="34" charset="-122"/>
               </a:rPr>
-              <a:t>2022.02.19</a:t>
+              <a:t>2022.03.19</a:t>
             </a:r>
             <a:endParaRPr lang="zh-CN" altLang="en-US" sz="1200" dirty="0">
               <a:solidFill>
@@ -5563,7 +5563,28 @@
                 <a:latin typeface="微软雅黑" panose="020B0503020204020204" pitchFamily="34" charset="-122"/>
                 <a:ea typeface="微软雅黑" panose="020B0503020204020204" pitchFamily="34" charset="-122"/>
               </a:rPr>
-              <a:t>订阅模式—实现</a:t>
+              <a:t>订阅模式</a:t>
+            </a:r>
+            <a:r>
+              <a:rPr lang="zh-CN" altLang="en-US" sz="2000" b="1" dirty="0">
+                <a:solidFill>
+                  <a:srgbClr val="717171"/>
+                </a:solidFill>
+                <a:latin typeface="微软雅黑" panose="020B0503020204020204" pitchFamily="34" charset="-122"/>
+                <a:ea typeface="微软雅黑" panose="020B0503020204020204" pitchFamily="34" charset="-122"/>
+                <a:sym typeface="+mn-ea"/>
+              </a:rPr>
+              <a:t>—</a:t>
+            </a:r>
+            <a:r>
+              <a:rPr lang="zh-CN" altLang="en-US" sz="2000" b="1" dirty="0">
+                <a:solidFill>
+                  <a:srgbClr val="717171"/>
+                </a:solidFill>
+                <a:latin typeface="微软雅黑" panose="020B0503020204020204" pitchFamily="34" charset="-122"/>
+                <a:ea typeface="微软雅黑" panose="020B0503020204020204" pitchFamily="34" charset="-122"/>
+              </a:rPr>
+              <a:t>区别</a:t>
             </a:r>
             <a:endParaRPr lang="zh-CN" altLang="en-US" sz="2000" b="1" dirty="0">
               <a:solidFill>
@@ -5727,6 +5748,340 @@
           </a:p>
         </p:txBody>
       </p:sp>
+      <p:sp>
+        <p:nvSpPr>
+          <p:cNvPr id="14" name="文本框 13"/>
+          <p:cNvSpPr txBox="1"/>
+          <p:nvPr/>
+        </p:nvSpPr>
+        <p:spPr>
+          <a:xfrm>
+            <a:off x="428581" y="1048841"/>
+            <a:ext cx="7887970" cy="1599565"/>
+          </a:xfrm>
+          <a:prstGeom prst="rect">
+            <a:avLst/>
+          </a:prstGeom>
+          <a:noFill/>
+        </p:spPr>
+        <p:txBody>
+          <a:bodyPr wrap="none" rtlCol="0">
+            <a:spAutoFit/>
+          </a:bodyPr>
+          <a:lstStyle/>
+          <a:p>
+            <a:r>
+              <a:rPr lang="en-US" altLang="zh-CN" sz="1400" b="0" i="0" dirty="0">
+                <a:solidFill>
+                  <a:srgbClr val="333333"/>
+                </a:solidFill>
+                <a:effectLst/>
+                <a:latin typeface="pingfang SC" panose="020B0400000000000000" charset="-122"/>
+              </a:rPr>
+              <a:t>1.  </a:t>
+            </a:r>
+            <a:r>
+              <a:rPr lang="zh-CN" altLang="en-US" sz="1400" b="1" i="0" dirty="0">
+                <a:solidFill>
+                  <a:srgbClr val="333333"/>
+                </a:solidFill>
+                <a:effectLst/>
+                <a:latin typeface="pingfang SC" panose="020B0400000000000000" charset="-122"/>
+              </a:rPr>
+              <a:t>耦合</a:t>
+            </a:r>
+            <a:r>
+              <a:rPr lang="zh-CN" altLang="en-US" sz="1400" b="0" i="0" dirty="0">
+                <a:solidFill>
+                  <a:srgbClr val="333333"/>
+                </a:solidFill>
+                <a:effectLst/>
+                <a:latin typeface="pingfang SC" panose="020B0400000000000000" charset="-122"/>
+              </a:rPr>
+              <a:t>：在观察者模式中，被观察者和观察者松散耦合；在订阅模式中，组件与订阅者完全分离。</a:t>
+            </a:r>
+            <a:endParaRPr lang="en-US" altLang="zh-CN" sz="1400" b="0" i="0" dirty="0">
+              <a:solidFill>
+                <a:srgbClr val="333333"/>
+              </a:solidFill>
+              <a:effectLst/>
+              <a:latin typeface="pingfang SC" panose="020B0400000000000000" charset="-122"/>
+            </a:endParaRPr>
+          </a:p>
+          <a:p>
+            <a:r>
+              <a:rPr lang="en-US" altLang="zh-CN" sz="1400" b="0" i="0" dirty="0">
+                <a:solidFill>
+                  <a:srgbClr val="333333"/>
+                </a:solidFill>
+                <a:effectLst/>
+                <a:latin typeface="pingfang SC" panose="020B0400000000000000" charset="-122"/>
+              </a:rPr>
+              <a:t>2. </a:t>
+            </a:r>
+            <a:r>
+              <a:rPr lang="zh-CN" altLang="en-US" sz="1400" b="1" i="0" dirty="0">
+                <a:solidFill>
+                  <a:srgbClr val="333333"/>
+                </a:solidFill>
+                <a:effectLst/>
+                <a:latin typeface="pingfang SC" panose="020B0400000000000000" charset="-122"/>
+              </a:rPr>
+              <a:t>通知</a:t>
+            </a:r>
+            <a:r>
+              <a:rPr lang="zh-CN" altLang="en-US" sz="1400" b="0" i="0" dirty="0">
+                <a:solidFill>
+                  <a:srgbClr val="333333"/>
+                </a:solidFill>
+                <a:effectLst/>
+                <a:latin typeface="pingfang SC" panose="020B0400000000000000" charset="-122"/>
+              </a:rPr>
+              <a:t>：在观察者模式中，被观察者知道如何通知观察者；在发布</a:t>
+            </a:r>
+            <a:r>
+              <a:rPr lang="en-US" altLang="zh-CN" sz="1400" b="0" i="0" dirty="0">
+                <a:solidFill>
+                  <a:srgbClr val="333333"/>
+                </a:solidFill>
+                <a:effectLst/>
+                <a:latin typeface="pingfang SC" panose="020B0400000000000000" charset="-122"/>
+              </a:rPr>
+              <a:t>/</a:t>
+            </a:r>
+            <a:r>
+              <a:rPr lang="zh-CN" altLang="en-US" sz="1400" b="0" i="0" dirty="0">
+                <a:solidFill>
+                  <a:srgbClr val="333333"/>
+                </a:solidFill>
+                <a:effectLst/>
+                <a:latin typeface="pingfang SC" panose="020B0400000000000000" charset="-122"/>
+              </a:rPr>
+              <a:t>订阅模式中，</a:t>
+            </a:r>
+            <a:r>
+              <a:rPr lang="en-US" altLang="zh-CN" sz="1400" b="0" i="0" dirty="0">
+                <a:solidFill>
+                  <a:srgbClr val="333333"/>
+                </a:solidFill>
+                <a:effectLst/>
+                <a:latin typeface="pingfang SC" panose="020B0400000000000000" charset="-122"/>
+              </a:rPr>
+              <a:t> </a:t>
+            </a:r>
+            <a:r>
+              <a:rPr lang="zh-CN" altLang="en-US" sz="1400" b="0" i="0" dirty="0">
+                <a:solidFill>
+                  <a:srgbClr val="333333"/>
+                </a:solidFill>
+                <a:effectLst/>
+                <a:latin typeface="pingfang SC" panose="020B0400000000000000" charset="-122"/>
+              </a:rPr>
+              <a:t>发布者</a:t>
+            </a:r>
+            <a:r>
+              <a:rPr lang="zh-CN" altLang="en-US" sz="1400" dirty="0">
+                <a:solidFill>
+                  <a:srgbClr val="333333"/>
+                </a:solidFill>
+                <a:latin typeface="pingfang SC" panose="020B0400000000000000" charset="-122"/>
+              </a:rPr>
+              <a:t>对</a:t>
+            </a:r>
+            <a:r>
+              <a:rPr lang="zh-CN" altLang="en-US" sz="1400" b="0" i="0" dirty="0">
+                <a:solidFill>
+                  <a:srgbClr val="333333"/>
+                </a:solidFill>
+                <a:effectLst/>
+                <a:latin typeface="pingfang SC" panose="020B0400000000000000" charset="-122"/>
+              </a:rPr>
+              <a:t>订阅者</a:t>
+            </a:r>
+            <a:endParaRPr lang="en-US" altLang="zh-CN" sz="1400" b="0" i="0" dirty="0">
+              <a:solidFill>
+                <a:srgbClr val="333333"/>
+              </a:solidFill>
+              <a:effectLst/>
+              <a:latin typeface="pingfang SC" panose="020B0400000000000000" charset="-122"/>
+            </a:endParaRPr>
+          </a:p>
+          <a:p>
+            <a:r>
+              <a:rPr lang="en-US" altLang="zh-CN" sz="1400" dirty="0">
+                <a:solidFill>
+                  <a:srgbClr val="333333"/>
+                </a:solidFill>
+                <a:latin typeface="pingfang SC" panose="020B0400000000000000" charset="-122"/>
+              </a:rPr>
+              <a:t>             </a:t>
+            </a:r>
+            <a:r>
+              <a:rPr lang="zh-CN" altLang="en-US" sz="1400" b="0" i="0" dirty="0">
+                <a:solidFill>
+                  <a:srgbClr val="333333"/>
+                </a:solidFill>
+                <a:effectLst/>
+                <a:latin typeface="pingfang SC" panose="020B0400000000000000" charset="-122"/>
+              </a:rPr>
+              <a:t>一无所知，它们只需在消息代理的帮助下进行通信。</a:t>
+            </a:r>
+            <a:endParaRPr lang="en-US" altLang="zh-CN" sz="1400" b="0" i="0" dirty="0">
+              <a:solidFill>
+                <a:srgbClr val="333333"/>
+              </a:solidFill>
+              <a:effectLst/>
+              <a:latin typeface="pingfang SC" panose="020B0400000000000000" charset="-122"/>
+            </a:endParaRPr>
+          </a:p>
+          <a:p>
+            <a:r>
+              <a:rPr lang="en-US" altLang="zh-CN" sz="1400" dirty="0">
+                <a:solidFill>
+                  <a:srgbClr val="333333"/>
+                </a:solidFill>
+                <a:latin typeface="pingfang SC" panose="020B0400000000000000" charset="-122"/>
+              </a:rPr>
+              <a:t>3. </a:t>
+            </a:r>
+            <a:r>
+              <a:rPr lang="zh-CN" altLang="en-US" sz="1400" b="1" dirty="0">
+                <a:solidFill>
+                  <a:srgbClr val="333333"/>
+                </a:solidFill>
+                <a:latin typeface="pingfang SC" panose="020B0400000000000000" charset="-122"/>
+              </a:rPr>
+              <a:t>异步</a:t>
+            </a:r>
+            <a:r>
+              <a:rPr lang="zh-CN" altLang="en-US" sz="1400" dirty="0">
+                <a:solidFill>
+                  <a:srgbClr val="333333"/>
+                </a:solidFill>
+                <a:latin typeface="pingfang SC" panose="020B0400000000000000" charset="-122"/>
+              </a:rPr>
+              <a:t>：</a:t>
+            </a:r>
+            <a:r>
+              <a:rPr lang="zh-CN" altLang="en-US" sz="1400" b="0" i="0" dirty="0">
+                <a:solidFill>
+                  <a:srgbClr val="333333"/>
+                </a:solidFill>
+                <a:effectLst/>
+                <a:latin typeface="pingfang SC" panose="020B0400000000000000" charset="-122"/>
+              </a:rPr>
+              <a:t>观察者模式主要是以同步方式发布消息</a:t>
+            </a:r>
+            <a:r>
+              <a:rPr lang="zh-CN" altLang="en-US" sz="1400" dirty="0">
+                <a:solidFill>
+                  <a:srgbClr val="333333"/>
+                </a:solidFill>
+                <a:latin typeface="pingfang SC" panose="020B0400000000000000" charset="-122"/>
+              </a:rPr>
+              <a:t>；</a:t>
+            </a:r>
+            <a:r>
+              <a:rPr lang="zh-CN" altLang="en-US" sz="1400" b="0" i="0" dirty="0">
+                <a:solidFill>
+                  <a:srgbClr val="333333"/>
+                </a:solidFill>
+                <a:effectLst/>
+                <a:latin typeface="pingfang SC" panose="020B0400000000000000" charset="-122"/>
+              </a:rPr>
+              <a:t>订阅模式通过消息代理实现异步发布消息。</a:t>
+            </a:r>
+            <a:endParaRPr lang="zh-CN" altLang="en-US" sz="1400" b="0" i="0" dirty="0">
+              <a:solidFill>
+                <a:srgbClr val="333333"/>
+              </a:solidFill>
+              <a:effectLst/>
+              <a:latin typeface="pingfang SC" panose="020B0400000000000000" charset="-122"/>
+            </a:endParaRPr>
+          </a:p>
+          <a:p>
+            <a:r>
+              <a:rPr lang="en-US" altLang="zh-CN" sz="1400" b="0" i="0" dirty="0">
+                <a:solidFill>
+                  <a:srgbClr val="333333"/>
+                </a:solidFill>
+                <a:effectLst/>
+                <a:latin typeface="pingfang SC" panose="020B0400000000000000" charset="-122"/>
+              </a:rPr>
+              <a:t>4. </a:t>
+            </a:r>
+            <a:r>
+              <a:rPr lang="zh-CN" altLang="en-US" sz="1400" b="1" i="0" dirty="0">
+                <a:solidFill>
+                  <a:srgbClr val="333333"/>
+                </a:solidFill>
+                <a:effectLst/>
+                <a:latin typeface="pingfang SC" panose="020B0400000000000000" charset="-122"/>
+              </a:rPr>
+              <a:t>关系</a:t>
+            </a:r>
+            <a:r>
+              <a:rPr lang="zh-CN" altLang="en-US" sz="1400" b="0" i="0" dirty="0">
+                <a:solidFill>
+                  <a:srgbClr val="333333"/>
+                </a:solidFill>
+                <a:effectLst/>
+                <a:latin typeface="pingfang SC" panose="020B0400000000000000" charset="-122"/>
+              </a:rPr>
+              <a:t>：观察者中，往往是一对多的关系，而订阅模式中，是多对多的关系。</a:t>
+            </a:r>
+            <a:endParaRPr lang="en-US" altLang="zh-CN" sz="1400" b="0" i="0" dirty="0">
+              <a:solidFill>
+                <a:srgbClr val="333333"/>
+              </a:solidFill>
+              <a:effectLst/>
+              <a:latin typeface="pingfang SC" panose="020B0400000000000000" charset="-122"/>
+            </a:endParaRPr>
+          </a:p>
+          <a:p>
+            <a:endParaRPr lang="zh-CN" altLang="en-US" sz="1400" b="0" i="0" dirty="0">
+              <a:solidFill>
+                <a:srgbClr val="333333"/>
+              </a:solidFill>
+              <a:effectLst/>
+              <a:latin typeface="pingfang SC" panose="020B0400000000000000" charset="-122"/>
+            </a:endParaRPr>
+          </a:p>
+          <a:p>
+            <a:endParaRPr lang="zh-CN" altLang="en-US" sz="1400" dirty="0"/>
+          </a:p>
+        </p:txBody>
+      </p:sp>
+      <p:pic>
+        <p:nvPicPr>
+          <p:cNvPr id="9" name="图片 8"/>
+          <p:cNvPicPr>
+            <a:picLocks noChangeAspect="1"/>
+          </p:cNvPicPr>
+          <p:nvPr/>
+        </p:nvPicPr>
+        <p:blipFill>
+          <a:blip r:embed="rId3">
+            <a:extLst>
+              <a:ext uri="{28A0092B-C50C-407E-A947-70E740481C1C}">
+                <a14:useLocalDpi xmlns:a14="http://schemas.microsoft.com/office/drawing/2010/main" val="0"/>
+              </a:ext>
+            </a:extLst>
+          </a:blip>
+          <a:stretch>
+            <a:fillRect/>
+          </a:stretch>
+        </p:blipFill>
+        <p:spPr>
+          <a:xfrm>
+            <a:off x="5814060" y="2648585"/>
+            <a:ext cx="2823210" cy="2239010"/>
+          </a:xfrm>
+          <a:prstGeom prst="rect">
+            <a:avLst/>
+          </a:prstGeom>
+        </p:spPr>
+      </p:pic>
     </p:spTree>
   </p:cSld>
   <p:clrMapOvr>
@@ -5782,30 +6137,19 @@
                 <a:latin typeface="微软雅黑" panose="020B0503020204020204" pitchFamily="34" charset="-122"/>
                 <a:ea typeface="微软雅黑" panose="020B0503020204020204" pitchFamily="34" charset="-122"/>
               </a:rPr>
-              <a:t>订阅模式</a:t>
-            </a:r>
-            <a:r>
-              <a:rPr lang="zh-CN" altLang="en-US" sz="2000" b="1" dirty="0">
+              <a:t>订阅模式—</a:t>
+            </a:r>
+            <a:r>
+              <a:rPr lang="en-US" altLang="zh-CN" sz="2000" b="1" dirty="0">
                 <a:solidFill>
                   <a:srgbClr val="717171"/>
                 </a:solidFill>
                 <a:latin typeface="微软雅黑" panose="020B0503020204020204" pitchFamily="34" charset="-122"/>
                 <a:ea typeface="微软雅黑" panose="020B0503020204020204" pitchFamily="34" charset="-122"/>
-                <a:sym typeface="+mn-ea"/>
-              </a:rPr>
-              <a:t>—</a:t>
-            </a:r>
-            <a:r>
-              <a:rPr lang="zh-CN" altLang="en-US" sz="2000" b="1" dirty="0">
-                <a:solidFill>
-                  <a:srgbClr val="717171"/>
-                </a:solidFill>
-                <a:latin typeface="微软雅黑" panose="020B0503020204020204" pitchFamily="34" charset="-122"/>
-                <a:ea typeface="微软雅黑" panose="020B0503020204020204" pitchFamily="34" charset="-122"/>
-              </a:rPr>
-              <a:t>区别</a:t>
-            </a:r>
-            <a:endParaRPr lang="zh-CN" altLang="en-US" sz="2000" b="1" dirty="0">
+              </a:rPr>
+              <a:t>UML</a:t>
+            </a:r>
+            <a:endParaRPr lang="en-US" altLang="zh-CN" sz="2000" b="1" dirty="0">
               <a:solidFill>
                 <a:srgbClr val="717171"/>
               </a:solidFill>
@@ -5967,334 +6311,24 @@
           </a:p>
         </p:txBody>
       </p:sp>
-      <p:sp>
-        <p:nvSpPr>
-          <p:cNvPr id="14" name="文本框 13"/>
-          <p:cNvSpPr txBox="1"/>
-          <p:nvPr/>
-        </p:nvSpPr>
-        <p:spPr>
-          <a:xfrm>
-            <a:off x="428581" y="1048841"/>
-            <a:ext cx="7887970" cy="1599565"/>
-          </a:xfrm>
-          <a:prstGeom prst="rect">
-            <a:avLst/>
-          </a:prstGeom>
-          <a:noFill/>
-        </p:spPr>
-        <p:txBody>
-          <a:bodyPr wrap="none" rtlCol="0">
-            <a:spAutoFit/>
-          </a:bodyPr>
-          <a:lstStyle/>
-          <a:p>
-            <a:r>
-              <a:rPr lang="en-US" altLang="zh-CN" sz="1400" b="0" i="0" dirty="0">
-                <a:solidFill>
-                  <a:srgbClr val="333333"/>
-                </a:solidFill>
-                <a:effectLst/>
-                <a:latin typeface="pingfang SC" panose="020B0400000000000000" charset="-122"/>
-              </a:rPr>
-              <a:t>1.  </a:t>
-            </a:r>
-            <a:r>
-              <a:rPr lang="zh-CN" altLang="en-US" sz="1400" b="1" i="0" dirty="0">
-                <a:solidFill>
-                  <a:srgbClr val="333333"/>
-                </a:solidFill>
-                <a:effectLst/>
-                <a:latin typeface="pingfang SC" panose="020B0400000000000000" charset="-122"/>
-              </a:rPr>
-              <a:t>耦合</a:t>
-            </a:r>
-            <a:r>
-              <a:rPr lang="zh-CN" altLang="en-US" sz="1400" b="0" i="0" dirty="0">
-                <a:solidFill>
-                  <a:srgbClr val="333333"/>
-                </a:solidFill>
-                <a:effectLst/>
-                <a:latin typeface="pingfang SC" panose="020B0400000000000000" charset="-122"/>
-              </a:rPr>
-              <a:t>：在观察者模式中，被观察者和观察者松散耦合；在订阅模式中，组件与订阅者完全分离。</a:t>
-            </a:r>
-            <a:endParaRPr lang="en-US" altLang="zh-CN" sz="1400" b="0" i="0" dirty="0">
-              <a:solidFill>
-                <a:srgbClr val="333333"/>
-              </a:solidFill>
-              <a:effectLst/>
-              <a:latin typeface="pingfang SC" panose="020B0400000000000000" charset="-122"/>
-            </a:endParaRPr>
-          </a:p>
-          <a:p>
-            <a:r>
-              <a:rPr lang="en-US" altLang="zh-CN" sz="1400" b="0" i="0" dirty="0">
-                <a:solidFill>
-                  <a:srgbClr val="333333"/>
-                </a:solidFill>
-                <a:effectLst/>
-                <a:latin typeface="pingfang SC" panose="020B0400000000000000" charset="-122"/>
-              </a:rPr>
-              <a:t>2. </a:t>
-            </a:r>
-            <a:r>
-              <a:rPr lang="zh-CN" altLang="en-US" sz="1400" b="1" i="0" dirty="0">
-                <a:solidFill>
-                  <a:srgbClr val="333333"/>
-                </a:solidFill>
-                <a:effectLst/>
-                <a:latin typeface="pingfang SC" panose="020B0400000000000000" charset="-122"/>
-              </a:rPr>
-              <a:t>通知</a:t>
-            </a:r>
-            <a:r>
-              <a:rPr lang="zh-CN" altLang="en-US" sz="1400" b="0" i="0" dirty="0">
-                <a:solidFill>
-                  <a:srgbClr val="333333"/>
-                </a:solidFill>
-                <a:effectLst/>
-                <a:latin typeface="pingfang SC" panose="020B0400000000000000" charset="-122"/>
-              </a:rPr>
-              <a:t>：在观察者模式中，被观察者知道如何通知观察者；在发布</a:t>
-            </a:r>
-            <a:r>
-              <a:rPr lang="en-US" altLang="zh-CN" sz="1400" b="0" i="0" dirty="0">
-                <a:solidFill>
-                  <a:srgbClr val="333333"/>
-                </a:solidFill>
-                <a:effectLst/>
-                <a:latin typeface="pingfang SC" panose="020B0400000000000000" charset="-122"/>
-              </a:rPr>
-              <a:t>/</a:t>
-            </a:r>
-            <a:r>
-              <a:rPr lang="zh-CN" altLang="en-US" sz="1400" b="0" i="0" dirty="0">
-                <a:solidFill>
-                  <a:srgbClr val="333333"/>
-                </a:solidFill>
-                <a:effectLst/>
-                <a:latin typeface="pingfang SC" panose="020B0400000000000000" charset="-122"/>
-              </a:rPr>
-              <a:t>订阅模式中，</a:t>
-            </a:r>
-            <a:r>
-              <a:rPr lang="en-US" altLang="zh-CN" sz="1400" b="0" i="0" dirty="0">
-                <a:solidFill>
-                  <a:srgbClr val="333333"/>
-                </a:solidFill>
-                <a:effectLst/>
-                <a:latin typeface="pingfang SC" panose="020B0400000000000000" charset="-122"/>
-              </a:rPr>
-              <a:t> </a:t>
-            </a:r>
-            <a:r>
-              <a:rPr lang="zh-CN" altLang="en-US" sz="1400" b="0" i="0" dirty="0">
-                <a:solidFill>
-                  <a:srgbClr val="333333"/>
-                </a:solidFill>
-                <a:effectLst/>
-                <a:latin typeface="pingfang SC" panose="020B0400000000000000" charset="-122"/>
-              </a:rPr>
-              <a:t>发布者</a:t>
-            </a:r>
-            <a:r>
-              <a:rPr lang="zh-CN" altLang="en-US" sz="1400" dirty="0">
-                <a:solidFill>
-                  <a:srgbClr val="333333"/>
-                </a:solidFill>
-                <a:latin typeface="pingfang SC" panose="020B0400000000000000" charset="-122"/>
-              </a:rPr>
-              <a:t>对</a:t>
-            </a:r>
-            <a:r>
-              <a:rPr lang="zh-CN" altLang="en-US" sz="1400" b="0" i="0" dirty="0">
-                <a:solidFill>
-                  <a:srgbClr val="333333"/>
-                </a:solidFill>
-                <a:effectLst/>
-                <a:latin typeface="pingfang SC" panose="020B0400000000000000" charset="-122"/>
-              </a:rPr>
-              <a:t>订阅者</a:t>
-            </a:r>
-            <a:endParaRPr lang="en-US" altLang="zh-CN" sz="1400" b="0" i="0" dirty="0">
-              <a:solidFill>
-                <a:srgbClr val="333333"/>
-              </a:solidFill>
-              <a:effectLst/>
-              <a:latin typeface="pingfang SC" panose="020B0400000000000000" charset="-122"/>
-            </a:endParaRPr>
-          </a:p>
-          <a:p>
-            <a:r>
-              <a:rPr lang="en-US" altLang="zh-CN" sz="1400" dirty="0">
-                <a:solidFill>
-                  <a:srgbClr val="333333"/>
-                </a:solidFill>
-                <a:latin typeface="pingfang SC" panose="020B0400000000000000" charset="-122"/>
-              </a:rPr>
-              <a:t>             </a:t>
-            </a:r>
-            <a:r>
-              <a:rPr lang="zh-CN" altLang="en-US" sz="1400" b="0" i="0" dirty="0">
-                <a:solidFill>
-                  <a:srgbClr val="333333"/>
-                </a:solidFill>
-                <a:effectLst/>
-                <a:latin typeface="pingfang SC" panose="020B0400000000000000" charset="-122"/>
-              </a:rPr>
-              <a:t>一无所知，它们只需在消息代理的帮助下进行通信。</a:t>
-            </a:r>
-            <a:endParaRPr lang="en-US" altLang="zh-CN" sz="1400" b="0" i="0" dirty="0">
-              <a:solidFill>
-                <a:srgbClr val="333333"/>
-              </a:solidFill>
-              <a:effectLst/>
-              <a:latin typeface="pingfang SC" panose="020B0400000000000000" charset="-122"/>
-            </a:endParaRPr>
-          </a:p>
-          <a:p>
-            <a:r>
-              <a:rPr lang="en-US" altLang="zh-CN" sz="1400" dirty="0">
-                <a:solidFill>
-                  <a:srgbClr val="333333"/>
-                </a:solidFill>
-                <a:latin typeface="pingfang SC" panose="020B0400000000000000" charset="-122"/>
-              </a:rPr>
-              <a:t>3. </a:t>
-            </a:r>
-            <a:r>
-              <a:rPr lang="zh-CN" altLang="en-US" sz="1400" b="1" dirty="0">
-                <a:solidFill>
-                  <a:srgbClr val="333333"/>
-                </a:solidFill>
-                <a:latin typeface="pingfang SC" panose="020B0400000000000000" charset="-122"/>
-              </a:rPr>
-              <a:t>异步</a:t>
-            </a:r>
-            <a:r>
-              <a:rPr lang="zh-CN" altLang="en-US" sz="1400" dirty="0">
-                <a:solidFill>
-                  <a:srgbClr val="333333"/>
-                </a:solidFill>
-                <a:latin typeface="pingfang SC" panose="020B0400000000000000" charset="-122"/>
-              </a:rPr>
-              <a:t>：</a:t>
-            </a:r>
-            <a:r>
-              <a:rPr lang="zh-CN" altLang="en-US" sz="1400" b="0" i="0" dirty="0">
-                <a:solidFill>
-                  <a:srgbClr val="333333"/>
-                </a:solidFill>
-                <a:effectLst/>
-                <a:latin typeface="pingfang SC" panose="020B0400000000000000" charset="-122"/>
-              </a:rPr>
-              <a:t>观察者模式主要是以同步方式发布消息</a:t>
-            </a:r>
-            <a:r>
-              <a:rPr lang="zh-CN" altLang="en-US" sz="1400" dirty="0">
-                <a:solidFill>
-                  <a:srgbClr val="333333"/>
-                </a:solidFill>
-                <a:latin typeface="pingfang SC" panose="020B0400000000000000" charset="-122"/>
-              </a:rPr>
-              <a:t>；</a:t>
-            </a:r>
-            <a:r>
-              <a:rPr lang="zh-CN" altLang="en-US" sz="1400" b="0" i="0" dirty="0">
-                <a:solidFill>
-                  <a:srgbClr val="333333"/>
-                </a:solidFill>
-                <a:effectLst/>
-                <a:latin typeface="pingfang SC" panose="020B0400000000000000" charset="-122"/>
-              </a:rPr>
-              <a:t>订阅模式通过消息代理实现异步发布消息。</a:t>
-            </a:r>
-            <a:endParaRPr lang="zh-CN" altLang="en-US" sz="1400" b="0" i="0" dirty="0">
-              <a:solidFill>
-                <a:srgbClr val="333333"/>
-              </a:solidFill>
-              <a:effectLst/>
-              <a:latin typeface="pingfang SC" panose="020B0400000000000000" charset="-122"/>
-            </a:endParaRPr>
-          </a:p>
-          <a:p>
-            <a:r>
-              <a:rPr lang="en-US" altLang="zh-CN" sz="1400" b="0" i="0" dirty="0">
-                <a:solidFill>
-                  <a:srgbClr val="333333"/>
-                </a:solidFill>
-                <a:effectLst/>
-                <a:latin typeface="pingfang SC" panose="020B0400000000000000" charset="-122"/>
-              </a:rPr>
-              <a:t>4. </a:t>
-            </a:r>
-            <a:r>
-              <a:rPr lang="zh-CN" altLang="en-US" sz="1400" b="1" i="0" dirty="0">
-                <a:solidFill>
-                  <a:srgbClr val="333333"/>
-                </a:solidFill>
-                <a:effectLst/>
-                <a:latin typeface="pingfang SC" panose="020B0400000000000000" charset="-122"/>
-              </a:rPr>
-              <a:t>关系</a:t>
-            </a:r>
-            <a:r>
-              <a:rPr lang="zh-CN" altLang="en-US" sz="1400" b="0" i="0" dirty="0">
-                <a:solidFill>
-                  <a:srgbClr val="333333"/>
-                </a:solidFill>
-                <a:effectLst/>
-                <a:latin typeface="pingfang SC" panose="020B0400000000000000" charset="-122"/>
-              </a:rPr>
-              <a:t>：观察者中，往往是一对多的关系，而订阅模式中，是多对多的关系。</a:t>
-            </a:r>
-            <a:endParaRPr lang="en-US" altLang="zh-CN" sz="1400" b="0" i="0" dirty="0">
-              <a:solidFill>
-                <a:srgbClr val="333333"/>
-              </a:solidFill>
-              <a:effectLst/>
-              <a:latin typeface="pingfang SC" panose="020B0400000000000000" charset="-122"/>
-            </a:endParaRPr>
-          </a:p>
-          <a:p>
-            <a:endParaRPr lang="zh-CN" altLang="en-US" sz="1400" b="0" i="0" dirty="0">
-              <a:solidFill>
-                <a:srgbClr val="333333"/>
-              </a:solidFill>
-              <a:effectLst/>
-              <a:latin typeface="pingfang SC" panose="020B0400000000000000" charset="-122"/>
-            </a:endParaRPr>
-          </a:p>
-          <a:p>
-            <a:endParaRPr lang="zh-CN" altLang="en-US" sz="1400" dirty="0"/>
-          </a:p>
-        </p:txBody>
-      </p:sp>
       <p:pic>
         <p:nvPicPr>
-          <p:cNvPr id="9" name="图片 8"/>
+          <p:cNvPr id="2" name="图片 1" descr="订阅模式"/>
           <p:cNvPicPr>
             <a:picLocks noChangeAspect="1"/>
           </p:cNvPicPr>
           <p:nvPr/>
         </p:nvPicPr>
         <p:blipFill>
-          <a:blip r:embed="rId3">
-            <a:extLst>
-              <a:ext uri="{28A0092B-C50C-407E-A947-70E740481C1C}">
-                <a14:useLocalDpi xmlns:a14="http://schemas.microsoft.com/office/drawing/2010/main" val="0"/>
-              </a:ext>
-            </a:extLst>
-          </a:blip>
+          <a:blip r:embed="rId3"/>
           <a:stretch>
             <a:fillRect/>
           </a:stretch>
         </p:blipFill>
         <p:spPr>
           <a:xfrm>
-            <a:off x="5814060" y="2648585"/>
-            <a:ext cx="2823210" cy="2239010"/>
+            <a:off x="932180" y="2153920"/>
+            <a:ext cx="7279640" cy="2813685"/>
           </a:xfrm>
           <a:prstGeom prst="rect">
             <a:avLst/>

</xml_diff>